<commit_message>
Adjunto la sesion 2 y 4
</commit_message>
<xml_diff>
--- a/Sesion 4/CATEGORIAS DE REVISTAS.pptx
+++ b/Sesion 4/CATEGORIAS DE REVISTAS.pptx
@@ -22,6 +22,18 @@
     <p:sldId id="272" r:id="rId16"/>
     <p:sldId id="273" r:id="rId17"/>
     <p:sldId id="274" r:id="rId18"/>
+    <p:sldId id="275" r:id="rId19"/>
+    <p:sldId id="276" r:id="rId20"/>
+    <p:sldId id="277" r:id="rId21"/>
+    <p:sldId id="278" r:id="rId22"/>
+    <p:sldId id="279" r:id="rId23"/>
+    <p:sldId id="280" r:id="rId24"/>
+    <p:sldId id="281" r:id="rId25"/>
+    <p:sldId id="282" r:id="rId26"/>
+    <p:sldId id="283" r:id="rId27"/>
+    <p:sldId id="284" r:id="rId28"/>
+    <p:sldId id="285" r:id="rId29"/>
+    <p:sldId id="286" r:id="rId30"/>
   </p:sldIdLst>
   <p:sldSz cx="12192000" cy="6858000"/>
   <p:notesSz cx="6858000" cy="9144000"/>
@@ -277,7 +289,7 @@
           <a:p>
             <a:fld id="{D6C86370-BF68-428A-98C2-CDBA3599B1B2}" type="datetimeFigureOut">
               <a:rPr lang="es-CO" smtClean="0"/>
-              <a:t>23/11/2024</a:t>
+              <a:t>25/11/2024</a:t>
             </a:fld>
             <a:endParaRPr lang="es-CO"/>
           </a:p>
@@ -477,7 +489,7 @@
           <a:p>
             <a:fld id="{D6C86370-BF68-428A-98C2-CDBA3599B1B2}" type="datetimeFigureOut">
               <a:rPr lang="es-CO" smtClean="0"/>
-              <a:t>23/11/2024</a:t>
+              <a:t>25/11/2024</a:t>
             </a:fld>
             <a:endParaRPr lang="es-CO"/>
           </a:p>
@@ -687,7 +699,7 @@
           <a:p>
             <a:fld id="{D6C86370-BF68-428A-98C2-CDBA3599B1B2}" type="datetimeFigureOut">
               <a:rPr lang="es-CO" smtClean="0"/>
-              <a:t>23/11/2024</a:t>
+              <a:t>25/11/2024</a:t>
             </a:fld>
             <a:endParaRPr lang="es-CO"/>
           </a:p>
@@ -887,7 +899,7 @@
           <a:p>
             <a:fld id="{D6C86370-BF68-428A-98C2-CDBA3599B1B2}" type="datetimeFigureOut">
               <a:rPr lang="es-CO" smtClean="0"/>
-              <a:t>23/11/2024</a:t>
+              <a:t>25/11/2024</a:t>
             </a:fld>
             <a:endParaRPr lang="es-CO"/>
           </a:p>
@@ -1163,7 +1175,7 @@
           <a:p>
             <a:fld id="{D6C86370-BF68-428A-98C2-CDBA3599B1B2}" type="datetimeFigureOut">
               <a:rPr lang="es-CO" smtClean="0"/>
-              <a:t>23/11/2024</a:t>
+              <a:t>25/11/2024</a:t>
             </a:fld>
             <a:endParaRPr lang="es-CO"/>
           </a:p>
@@ -1431,7 +1443,7 @@
           <a:p>
             <a:fld id="{D6C86370-BF68-428A-98C2-CDBA3599B1B2}" type="datetimeFigureOut">
               <a:rPr lang="es-CO" smtClean="0"/>
-              <a:t>23/11/2024</a:t>
+              <a:t>25/11/2024</a:t>
             </a:fld>
             <a:endParaRPr lang="es-CO"/>
           </a:p>
@@ -1846,7 +1858,7 @@
           <a:p>
             <a:fld id="{D6C86370-BF68-428A-98C2-CDBA3599B1B2}" type="datetimeFigureOut">
               <a:rPr lang="es-CO" smtClean="0"/>
-              <a:t>23/11/2024</a:t>
+              <a:t>25/11/2024</a:t>
             </a:fld>
             <a:endParaRPr lang="es-CO"/>
           </a:p>
@@ -1988,7 +2000,7 @@
           <a:p>
             <a:fld id="{D6C86370-BF68-428A-98C2-CDBA3599B1B2}" type="datetimeFigureOut">
               <a:rPr lang="es-CO" smtClean="0"/>
-              <a:t>23/11/2024</a:t>
+              <a:t>25/11/2024</a:t>
             </a:fld>
             <a:endParaRPr lang="es-CO"/>
           </a:p>
@@ -2101,7 +2113,7 @@
           <a:p>
             <a:fld id="{D6C86370-BF68-428A-98C2-CDBA3599B1B2}" type="datetimeFigureOut">
               <a:rPr lang="es-CO" smtClean="0"/>
-              <a:t>23/11/2024</a:t>
+              <a:t>25/11/2024</a:t>
             </a:fld>
             <a:endParaRPr lang="es-CO"/>
           </a:p>
@@ -2414,7 +2426,7 @@
           <a:p>
             <a:fld id="{D6C86370-BF68-428A-98C2-CDBA3599B1B2}" type="datetimeFigureOut">
               <a:rPr lang="es-CO" smtClean="0"/>
-              <a:t>23/11/2024</a:t>
+              <a:t>25/11/2024</a:t>
             </a:fld>
             <a:endParaRPr lang="es-CO"/>
           </a:p>
@@ -2703,7 +2715,7 @@
           <a:p>
             <a:fld id="{D6C86370-BF68-428A-98C2-CDBA3599B1B2}" type="datetimeFigureOut">
               <a:rPr lang="es-CO" smtClean="0"/>
-              <a:t>23/11/2024</a:t>
+              <a:t>25/11/2024</a:t>
             </a:fld>
             <a:endParaRPr lang="es-CO"/>
           </a:p>
@@ -2946,7 +2958,7 @@
           <a:p>
             <a:fld id="{D6C86370-BF68-428A-98C2-CDBA3599B1B2}" type="datetimeFigureOut">
               <a:rPr lang="es-CO" smtClean="0"/>
-              <a:t>23/11/2024</a:t>
+              <a:t>25/11/2024</a:t>
             </a:fld>
             <a:endParaRPr lang="es-CO"/>
           </a:p>
@@ -6332,6 +6344,730 @@
 </p:sld>
 </file>
 
+<file path=ppt/slides/slide18.xml><?xml version="1.0" encoding="utf-8"?>
+<p:sld xmlns:a="http://schemas.openxmlformats.org/drawingml/2006/main" xmlns:r="http://schemas.openxmlformats.org/officeDocument/2006/relationships" xmlns:p="http://schemas.openxmlformats.org/presentationml/2006/main">
+  <p:cSld>
+    <p:spTree>
+      <p:nvGrpSpPr>
+        <p:cNvPr id="1" name=""/>
+        <p:cNvGrpSpPr/>
+        <p:nvPr/>
+      </p:nvGrpSpPr>
+      <p:grpSpPr>
+        <a:xfrm>
+          <a:off x="0" y="0"/>
+          <a:ext cx="0" cy="0"/>
+          <a:chOff x="0" y="0"/>
+          <a:chExt cx="0" cy="0"/>
+        </a:xfrm>
+      </p:grpSpPr>
+      <p:pic>
+        <p:nvPicPr>
+          <p:cNvPr id="1026" name="Picture 2" descr="Fondo rojo con textura vintage continental, rojo, retro, continental png |  PNGWing">
+            <a:extLst>
+              <a:ext uri="{FF2B5EF4-FFF2-40B4-BE49-F238E27FC236}">
+                <a16:creationId xmlns:a16="http://schemas.microsoft.com/office/drawing/2014/main" id="{65048E78-8E01-4EC2-8FA0-C0F9A4B8A93A}"/>
+              </a:ext>
+            </a:extLst>
+          </p:cNvPr>
+          <p:cNvPicPr>
+            <a:picLocks noChangeAspect="1" noChangeArrowheads="1"/>
+          </p:cNvPicPr>
+          <p:nvPr/>
+        </p:nvPicPr>
+        <p:blipFill>
+          <a:blip r:embed="rId2">
+            <a:extLst>
+              <a:ext uri="{28A0092B-C50C-407E-A947-70E740481C1C}">
+                <a14:useLocalDpi xmlns:a14="http://schemas.microsoft.com/office/drawing/2010/main" val="0"/>
+              </a:ext>
+            </a:extLst>
+          </a:blip>
+          <a:srcRect/>
+          <a:stretch>
+            <a:fillRect/>
+          </a:stretch>
+        </p:blipFill>
+        <p:spPr bwMode="auto">
+          <a:xfrm>
+            <a:off x="0" y="0"/>
+            <a:ext cx="12192000" cy="6696635"/>
+          </a:xfrm>
+          <a:prstGeom prst="rect">
+            <a:avLst/>
+          </a:prstGeom>
+          <a:noFill/>
+          <a:extLst>
+            <a:ext uri="{909E8E84-426E-40DD-AFC4-6F175D3DCCD1}">
+              <a14:hiddenFill xmlns:a14="http://schemas.microsoft.com/office/drawing/2010/main">
+                <a:solidFill>
+                  <a:srgbClr val="FFFFFF"/>
+                </a:solidFill>
+              </a14:hiddenFill>
+            </a:ext>
+          </a:extLst>
+        </p:spPr>
+      </p:pic>
+      <p:pic>
+        <p:nvPicPr>
+          <p:cNvPr id="3" name="Picture 4" descr="tablero de madera en estilo de dibujos animados 8853564 PNG">
+            <a:extLst>
+              <a:ext uri="{FF2B5EF4-FFF2-40B4-BE49-F238E27FC236}">
+                <a16:creationId xmlns:a16="http://schemas.microsoft.com/office/drawing/2014/main" id="{EFC82DF3-927C-4A51-8E8B-E1DA5E532552}"/>
+              </a:ext>
+            </a:extLst>
+          </p:cNvPr>
+          <p:cNvPicPr>
+            <a:picLocks noChangeAspect="1" noChangeArrowheads="1"/>
+          </p:cNvPicPr>
+          <p:nvPr/>
+        </p:nvPicPr>
+        <p:blipFill>
+          <a:blip r:embed="rId3">
+            <a:extLst>
+              <a:ext uri="{28A0092B-C50C-407E-A947-70E740481C1C}">
+                <a14:useLocalDpi xmlns:a14="http://schemas.microsoft.com/office/drawing/2010/main" val="0"/>
+              </a:ext>
+            </a:extLst>
+          </a:blip>
+          <a:srcRect/>
+          <a:stretch>
+            <a:fillRect/>
+          </a:stretch>
+        </p:blipFill>
+        <p:spPr bwMode="auto">
+          <a:xfrm>
+            <a:off x="2133887" y="1790401"/>
+            <a:ext cx="7924222" cy="3912585"/>
+          </a:xfrm>
+          <a:prstGeom prst="rect">
+            <a:avLst/>
+          </a:prstGeom>
+          <a:noFill/>
+          <a:extLst>
+            <a:ext uri="{909E8E84-426E-40DD-AFC4-6F175D3DCCD1}">
+              <a14:hiddenFill xmlns:a14="http://schemas.microsoft.com/office/drawing/2010/main">
+                <a:solidFill>
+                  <a:srgbClr val="FFFFFF"/>
+                </a:solidFill>
+              </a14:hiddenFill>
+            </a:ext>
+          </a:extLst>
+        </p:spPr>
+      </p:pic>
+      <p:sp>
+        <p:nvSpPr>
+          <p:cNvPr id="46" name="CuadroTexto 45">
+            <a:extLst>
+              <a:ext uri="{FF2B5EF4-FFF2-40B4-BE49-F238E27FC236}">
+                <a16:creationId xmlns:a16="http://schemas.microsoft.com/office/drawing/2014/main" id="{738A3F34-A4B1-4DDC-BBE8-4F245C52246D}"/>
+              </a:ext>
+            </a:extLst>
+          </p:cNvPr>
+          <p:cNvSpPr txBox="1"/>
+          <p:nvPr/>
+        </p:nvSpPr>
+        <p:spPr>
+          <a:xfrm>
+            <a:off x="3698235" y="1953417"/>
+            <a:ext cx="4786859" cy="369332"/>
+          </a:xfrm>
+          <a:prstGeom prst="rect">
+            <a:avLst/>
+          </a:prstGeom>
+          <a:noFill/>
+        </p:spPr>
+        <p:txBody>
+          <a:bodyPr wrap="square">
+            <a:spAutoFit/>
+          </a:bodyPr>
+          <a:lstStyle/>
+          <a:p>
+            <a:pPr algn="ctr"/>
+            <a:r>
+              <a:rPr lang="es-MX" b="1" i="0" dirty="0">
+                <a:effectLst/>
+                <a:latin typeface="Imprint MT Shadow" panose="04020605060303030202" pitchFamily="82" charset="0"/>
+              </a:rPr>
+              <a:t>Titulo: Academy of Management Review</a:t>
+            </a:r>
+            <a:endParaRPr lang="es-CO" b="1" dirty="0">
+              <a:latin typeface="Imprint MT Shadow" panose="04020605060303030202" pitchFamily="82" charset="0"/>
+            </a:endParaRPr>
+          </a:p>
+        </p:txBody>
+      </p:sp>
+      <p:sp>
+        <p:nvSpPr>
+          <p:cNvPr id="47" name="CuadroTexto 46">
+            <a:extLst>
+              <a:ext uri="{FF2B5EF4-FFF2-40B4-BE49-F238E27FC236}">
+                <a16:creationId xmlns:a16="http://schemas.microsoft.com/office/drawing/2014/main" id="{7F7AE6D4-BF2C-4D6B-A3A4-07B373895627}"/>
+              </a:ext>
+            </a:extLst>
+          </p:cNvPr>
+          <p:cNvSpPr txBox="1"/>
+          <p:nvPr/>
+        </p:nvSpPr>
+        <p:spPr>
+          <a:xfrm>
+            <a:off x="5513557" y="379491"/>
+            <a:ext cx="1438572" cy="1015663"/>
+          </a:xfrm>
+          <a:prstGeom prst="rect">
+            <a:avLst/>
+          </a:prstGeom>
+          <a:noFill/>
+        </p:spPr>
+        <p:txBody>
+          <a:bodyPr wrap="square" rtlCol="0">
+            <a:spAutoFit/>
+          </a:bodyPr>
+          <a:lstStyle/>
+          <a:p>
+            <a:pPr algn="ctr"/>
+            <a:r>
+              <a:rPr lang="es-CO" sz="6000" b="1" dirty="0">
+                <a:solidFill>
+                  <a:srgbClr val="FFFF00"/>
+                </a:solidFill>
+                <a:latin typeface="Cooper Black" panose="0208090404030B020404" pitchFamily="18" charset="0"/>
+              </a:rPr>
+              <a:t>Q1</a:t>
+            </a:r>
+          </a:p>
+        </p:txBody>
+      </p:sp>
+      <p:sp>
+        <p:nvSpPr>
+          <p:cNvPr id="48" name="CuadroTexto 47">
+            <a:extLst>
+              <a:ext uri="{FF2B5EF4-FFF2-40B4-BE49-F238E27FC236}">
+                <a16:creationId xmlns:a16="http://schemas.microsoft.com/office/drawing/2014/main" id="{81A58E24-5C80-48F2-81EE-B2460C9B0C03}"/>
+              </a:ext>
+            </a:extLst>
+          </p:cNvPr>
+          <p:cNvSpPr txBox="1"/>
+          <p:nvPr/>
+        </p:nvSpPr>
+        <p:spPr>
+          <a:xfrm>
+            <a:off x="5184002" y="2911906"/>
+            <a:ext cx="1815323" cy="369332"/>
+          </a:xfrm>
+          <a:prstGeom prst="rect">
+            <a:avLst/>
+          </a:prstGeom>
+          <a:noFill/>
+        </p:spPr>
+        <p:txBody>
+          <a:bodyPr wrap="square">
+            <a:spAutoFit/>
+          </a:bodyPr>
+          <a:lstStyle/>
+          <a:p>
+            <a:pPr algn="ctr"/>
+            <a:r>
+              <a:rPr lang="es-MX" b="1" i="0" dirty="0">
+                <a:effectLst/>
+                <a:latin typeface="Imprint MT Shadow" panose="04020605060303030202" pitchFamily="82" charset="0"/>
+              </a:rPr>
+              <a:t>Categoría: Q1</a:t>
+            </a:r>
+            <a:endParaRPr lang="es-CO" b="1" dirty="0">
+              <a:latin typeface="Imprint MT Shadow" panose="04020605060303030202" pitchFamily="82" charset="0"/>
+            </a:endParaRPr>
+          </a:p>
+        </p:txBody>
+      </p:sp>
+      <p:sp>
+        <p:nvSpPr>
+          <p:cNvPr id="7" name="CuadroTexto 6">
+            <a:extLst>
+              <a:ext uri="{FF2B5EF4-FFF2-40B4-BE49-F238E27FC236}">
+                <a16:creationId xmlns:a16="http://schemas.microsoft.com/office/drawing/2014/main" id="{A985E777-DDCE-4DD2-8278-DEBB2A071293}"/>
+              </a:ext>
+            </a:extLst>
+          </p:cNvPr>
+          <p:cNvSpPr txBox="1"/>
+          <p:nvPr/>
+        </p:nvSpPr>
+        <p:spPr>
+          <a:xfrm>
+            <a:off x="5184001" y="3828201"/>
+            <a:ext cx="2669081" cy="369332"/>
+          </a:xfrm>
+          <a:prstGeom prst="rect">
+            <a:avLst/>
+          </a:prstGeom>
+          <a:noFill/>
+        </p:spPr>
+        <p:txBody>
+          <a:bodyPr wrap="square">
+            <a:spAutoFit/>
+          </a:bodyPr>
+          <a:lstStyle/>
+          <a:p>
+            <a:pPr algn="ctr"/>
+            <a:r>
+              <a:rPr lang="es-MX" b="1" i="0" dirty="0">
+                <a:effectLst/>
+                <a:latin typeface="Imprint MT Shadow" panose="04020605060303030202" pitchFamily="82" charset="0"/>
+              </a:rPr>
+              <a:t>Contexto: Intern</a:t>
+            </a:r>
+            <a:r>
+              <a:rPr lang="es-MX" b="1" dirty="0">
+                <a:latin typeface="Imprint MT Shadow" panose="04020605060303030202" pitchFamily="82" charset="0"/>
+              </a:rPr>
+              <a:t>acional</a:t>
+            </a:r>
+            <a:endParaRPr lang="es-CO" b="1" dirty="0">
+              <a:latin typeface="Imprint MT Shadow" panose="04020605060303030202" pitchFamily="82" charset="0"/>
+            </a:endParaRPr>
+          </a:p>
+        </p:txBody>
+      </p:sp>
+      <p:sp>
+        <p:nvSpPr>
+          <p:cNvPr id="8" name="CuadroTexto 7">
+            <a:extLst>
+              <a:ext uri="{FF2B5EF4-FFF2-40B4-BE49-F238E27FC236}">
+                <a16:creationId xmlns:a16="http://schemas.microsoft.com/office/drawing/2014/main" id="{A1D628A2-2118-4DF9-A7AD-4C9F218C6D22}"/>
+              </a:ext>
+            </a:extLst>
+          </p:cNvPr>
+          <p:cNvSpPr txBox="1"/>
+          <p:nvPr/>
+        </p:nvSpPr>
+        <p:spPr>
+          <a:xfrm>
+            <a:off x="4356848" y="4744496"/>
+            <a:ext cx="3845858" cy="369332"/>
+          </a:xfrm>
+          <a:prstGeom prst="rect">
+            <a:avLst/>
+          </a:prstGeom>
+          <a:noFill/>
+        </p:spPr>
+        <p:txBody>
+          <a:bodyPr wrap="square">
+            <a:spAutoFit/>
+          </a:bodyPr>
+          <a:lstStyle/>
+          <a:p>
+            <a:pPr algn="ctr"/>
+            <a:r>
+              <a:rPr lang="es-MX" b="1" dirty="0">
+                <a:latin typeface="Imprint MT Shadow" panose="04020605060303030202" pitchFamily="82" charset="0"/>
+              </a:rPr>
+              <a:t>Publicado por</a:t>
+            </a:r>
+            <a:r>
+              <a:rPr lang="es-MX" b="1" i="0" dirty="0">
+                <a:effectLst/>
+                <a:latin typeface="Imprint MT Shadow" panose="04020605060303030202" pitchFamily="82" charset="0"/>
+              </a:rPr>
+              <a:t>: </a:t>
+            </a:r>
+            <a:r>
+              <a:rPr lang="es-MX" b="1" dirty="0">
+                <a:latin typeface="Imprint MT Shadow" panose="04020605060303030202" pitchFamily="82" charset="0"/>
+              </a:rPr>
+              <a:t>Kris Byron</a:t>
+            </a:r>
+            <a:endParaRPr lang="es-CO" b="1" dirty="0">
+              <a:latin typeface="Imprint MT Shadow" panose="04020605060303030202" pitchFamily="82" charset="0"/>
+            </a:endParaRPr>
+          </a:p>
+        </p:txBody>
+      </p:sp>
+    </p:spTree>
+    <p:extLst>
+      <p:ext uri="{BB962C8B-B14F-4D97-AF65-F5344CB8AC3E}">
+        <p14:creationId xmlns:p14="http://schemas.microsoft.com/office/powerpoint/2010/main" val="2785378415"/>
+      </p:ext>
+    </p:extLst>
+  </p:cSld>
+  <p:clrMapOvr>
+    <a:masterClrMapping/>
+  </p:clrMapOvr>
+</p:sld>
+</file>
+
+<file path=ppt/slides/slide19.xml><?xml version="1.0" encoding="utf-8"?>
+<p:sld xmlns:a="http://schemas.openxmlformats.org/drawingml/2006/main" xmlns:r="http://schemas.openxmlformats.org/officeDocument/2006/relationships" xmlns:p="http://schemas.openxmlformats.org/presentationml/2006/main">
+  <p:cSld>
+    <p:spTree>
+      <p:nvGrpSpPr>
+        <p:cNvPr id="1" name=""/>
+        <p:cNvGrpSpPr/>
+        <p:nvPr/>
+      </p:nvGrpSpPr>
+      <p:grpSpPr>
+        <a:xfrm>
+          <a:off x="0" y="0"/>
+          <a:ext cx="0" cy="0"/>
+          <a:chOff x="0" y="0"/>
+          <a:chExt cx="0" cy="0"/>
+        </a:xfrm>
+      </p:grpSpPr>
+      <p:pic>
+        <p:nvPicPr>
+          <p:cNvPr id="1026" name="Picture 2" descr="Fondo rojo con textura vintage continental, rojo, retro, continental png |  PNGWing">
+            <a:extLst>
+              <a:ext uri="{FF2B5EF4-FFF2-40B4-BE49-F238E27FC236}">
+                <a16:creationId xmlns:a16="http://schemas.microsoft.com/office/drawing/2014/main" id="{65048E78-8E01-4EC2-8FA0-C0F9A4B8A93A}"/>
+              </a:ext>
+            </a:extLst>
+          </p:cNvPr>
+          <p:cNvPicPr>
+            <a:picLocks noChangeAspect="1" noChangeArrowheads="1"/>
+          </p:cNvPicPr>
+          <p:nvPr/>
+        </p:nvPicPr>
+        <p:blipFill>
+          <a:blip r:embed="rId2">
+            <a:extLst>
+              <a:ext uri="{28A0092B-C50C-407E-A947-70E740481C1C}">
+                <a14:useLocalDpi xmlns:a14="http://schemas.microsoft.com/office/drawing/2010/main" val="0"/>
+              </a:ext>
+            </a:extLst>
+          </a:blip>
+          <a:srcRect/>
+          <a:stretch>
+            <a:fillRect/>
+          </a:stretch>
+        </p:blipFill>
+        <p:spPr bwMode="auto">
+          <a:xfrm>
+            <a:off x="0" y="0"/>
+            <a:ext cx="12192000" cy="6696635"/>
+          </a:xfrm>
+          <a:prstGeom prst="rect">
+            <a:avLst/>
+          </a:prstGeom>
+          <a:noFill/>
+          <a:extLst>
+            <a:ext uri="{909E8E84-426E-40DD-AFC4-6F175D3DCCD1}">
+              <a14:hiddenFill xmlns:a14="http://schemas.microsoft.com/office/drawing/2010/main">
+                <a:solidFill>
+                  <a:srgbClr val="FFFFFF"/>
+                </a:solidFill>
+              </a14:hiddenFill>
+            </a:ext>
+          </a:extLst>
+        </p:spPr>
+      </p:pic>
+      <p:pic>
+        <p:nvPicPr>
+          <p:cNvPr id="3" name="Picture 4" descr="tablero de madera en estilo de dibujos animados 8853564 PNG">
+            <a:extLst>
+              <a:ext uri="{FF2B5EF4-FFF2-40B4-BE49-F238E27FC236}">
+                <a16:creationId xmlns:a16="http://schemas.microsoft.com/office/drawing/2014/main" id="{EFC82DF3-927C-4A51-8E8B-E1DA5E532552}"/>
+              </a:ext>
+            </a:extLst>
+          </p:cNvPr>
+          <p:cNvPicPr>
+            <a:picLocks noChangeAspect="1" noChangeArrowheads="1"/>
+          </p:cNvPicPr>
+          <p:nvPr/>
+        </p:nvPicPr>
+        <p:blipFill>
+          <a:blip r:embed="rId3">
+            <a:extLst>
+              <a:ext uri="{28A0092B-C50C-407E-A947-70E740481C1C}">
+                <a14:useLocalDpi xmlns:a14="http://schemas.microsoft.com/office/drawing/2010/main" val="0"/>
+              </a:ext>
+            </a:extLst>
+          </a:blip>
+          <a:srcRect/>
+          <a:stretch>
+            <a:fillRect/>
+          </a:stretch>
+        </p:blipFill>
+        <p:spPr bwMode="auto">
+          <a:xfrm>
+            <a:off x="2133887" y="1790401"/>
+            <a:ext cx="7924222" cy="3912585"/>
+          </a:xfrm>
+          <a:prstGeom prst="rect">
+            <a:avLst/>
+          </a:prstGeom>
+          <a:noFill/>
+          <a:extLst>
+            <a:ext uri="{909E8E84-426E-40DD-AFC4-6F175D3DCCD1}">
+              <a14:hiddenFill xmlns:a14="http://schemas.microsoft.com/office/drawing/2010/main">
+                <a:solidFill>
+                  <a:srgbClr val="FFFFFF"/>
+                </a:solidFill>
+              </a14:hiddenFill>
+            </a:ext>
+          </a:extLst>
+        </p:spPr>
+      </p:pic>
+      <p:sp>
+        <p:nvSpPr>
+          <p:cNvPr id="46" name="CuadroTexto 45">
+            <a:extLst>
+              <a:ext uri="{FF2B5EF4-FFF2-40B4-BE49-F238E27FC236}">
+                <a16:creationId xmlns:a16="http://schemas.microsoft.com/office/drawing/2014/main" id="{738A3F34-A4B1-4DDC-BBE8-4F245C52246D}"/>
+              </a:ext>
+            </a:extLst>
+          </p:cNvPr>
+          <p:cNvSpPr txBox="1"/>
+          <p:nvPr/>
+        </p:nvSpPr>
+        <p:spPr>
+          <a:xfrm>
+            <a:off x="3698235" y="1953417"/>
+            <a:ext cx="4786859" cy="369332"/>
+          </a:xfrm>
+          <a:prstGeom prst="rect">
+            <a:avLst/>
+          </a:prstGeom>
+          <a:noFill/>
+        </p:spPr>
+        <p:txBody>
+          <a:bodyPr wrap="square">
+            <a:spAutoFit/>
+          </a:bodyPr>
+          <a:lstStyle/>
+          <a:p>
+            <a:pPr algn="ctr"/>
+            <a:r>
+              <a:rPr lang="es-MX" b="1" i="0" dirty="0">
+                <a:effectLst/>
+                <a:latin typeface="Imprint MT Shadow" panose="04020605060303030202" pitchFamily="82" charset="0"/>
+              </a:rPr>
+              <a:t>Titulo: </a:t>
+            </a:r>
+            <a:r>
+              <a:rPr lang="es-MX" b="1" i="0" dirty="0" err="1">
+                <a:effectLst/>
+                <a:latin typeface="Imprint MT Shadow" panose="04020605060303030202" pitchFamily="82" charset="0"/>
+              </a:rPr>
+              <a:t>Accident</a:t>
+            </a:r>
+            <a:r>
+              <a:rPr lang="es-MX" b="1" i="0" dirty="0">
+                <a:effectLst/>
+                <a:latin typeface="Imprint MT Shadow" panose="04020605060303030202" pitchFamily="82" charset="0"/>
+              </a:rPr>
+              <a:t> </a:t>
+            </a:r>
+            <a:r>
+              <a:rPr lang="es-MX" b="1" i="0" dirty="0" err="1">
+                <a:effectLst/>
+                <a:latin typeface="Imprint MT Shadow" panose="04020605060303030202" pitchFamily="82" charset="0"/>
+              </a:rPr>
+              <a:t>Analysis</a:t>
+            </a:r>
+            <a:r>
+              <a:rPr lang="es-MX" b="1" i="0" dirty="0">
+                <a:effectLst/>
+                <a:latin typeface="Imprint MT Shadow" panose="04020605060303030202" pitchFamily="82" charset="0"/>
+              </a:rPr>
+              <a:t> and </a:t>
+            </a:r>
+            <a:r>
+              <a:rPr lang="es-MX" b="1" i="0" dirty="0" err="1">
+                <a:effectLst/>
+                <a:latin typeface="Imprint MT Shadow" panose="04020605060303030202" pitchFamily="82" charset="0"/>
+              </a:rPr>
+              <a:t>Prevention</a:t>
+            </a:r>
+            <a:endParaRPr lang="es-CO" b="1" dirty="0">
+              <a:latin typeface="Imprint MT Shadow" panose="04020605060303030202" pitchFamily="82" charset="0"/>
+            </a:endParaRPr>
+          </a:p>
+        </p:txBody>
+      </p:sp>
+      <p:sp>
+        <p:nvSpPr>
+          <p:cNvPr id="47" name="CuadroTexto 46">
+            <a:extLst>
+              <a:ext uri="{FF2B5EF4-FFF2-40B4-BE49-F238E27FC236}">
+                <a16:creationId xmlns:a16="http://schemas.microsoft.com/office/drawing/2014/main" id="{7F7AE6D4-BF2C-4D6B-A3A4-07B373895627}"/>
+              </a:ext>
+            </a:extLst>
+          </p:cNvPr>
+          <p:cNvSpPr txBox="1"/>
+          <p:nvPr/>
+        </p:nvSpPr>
+        <p:spPr>
+          <a:xfrm>
+            <a:off x="5513557" y="379491"/>
+            <a:ext cx="1438572" cy="1015663"/>
+          </a:xfrm>
+          <a:prstGeom prst="rect">
+            <a:avLst/>
+          </a:prstGeom>
+          <a:noFill/>
+        </p:spPr>
+        <p:txBody>
+          <a:bodyPr wrap="square" rtlCol="0">
+            <a:spAutoFit/>
+          </a:bodyPr>
+          <a:lstStyle/>
+          <a:p>
+            <a:pPr algn="ctr"/>
+            <a:r>
+              <a:rPr lang="es-CO" sz="6000" b="1" dirty="0">
+                <a:solidFill>
+                  <a:srgbClr val="FFFF00"/>
+                </a:solidFill>
+                <a:latin typeface="Cooper Black" panose="0208090404030B020404" pitchFamily="18" charset="0"/>
+              </a:rPr>
+              <a:t>Q1</a:t>
+            </a:r>
+          </a:p>
+        </p:txBody>
+      </p:sp>
+      <p:sp>
+        <p:nvSpPr>
+          <p:cNvPr id="48" name="CuadroTexto 47">
+            <a:extLst>
+              <a:ext uri="{FF2B5EF4-FFF2-40B4-BE49-F238E27FC236}">
+                <a16:creationId xmlns:a16="http://schemas.microsoft.com/office/drawing/2014/main" id="{81A58E24-5C80-48F2-81EE-B2460C9B0C03}"/>
+              </a:ext>
+            </a:extLst>
+          </p:cNvPr>
+          <p:cNvSpPr txBox="1"/>
+          <p:nvPr/>
+        </p:nvSpPr>
+        <p:spPr>
+          <a:xfrm>
+            <a:off x="5184002" y="2911906"/>
+            <a:ext cx="1815323" cy="369332"/>
+          </a:xfrm>
+          <a:prstGeom prst="rect">
+            <a:avLst/>
+          </a:prstGeom>
+          <a:noFill/>
+        </p:spPr>
+        <p:txBody>
+          <a:bodyPr wrap="square">
+            <a:spAutoFit/>
+          </a:bodyPr>
+          <a:lstStyle/>
+          <a:p>
+            <a:pPr algn="ctr"/>
+            <a:r>
+              <a:rPr lang="es-MX" b="1" i="0" dirty="0">
+                <a:effectLst/>
+                <a:latin typeface="Imprint MT Shadow" panose="04020605060303030202" pitchFamily="82" charset="0"/>
+              </a:rPr>
+              <a:t>Categoría: Q1</a:t>
+            </a:r>
+            <a:endParaRPr lang="es-CO" b="1" dirty="0">
+              <a:latin typeface="Imprint MT Shadow" panose="04020605060303030202" pitchFamily="82" charset="0"/>
+            </a:endParaRPr>
+          </a:p>
+        </p:txBody>
+      </p:sp>
+      <p:sp>
+        <p:nvSpPr>
+          <p:cNvPr id="7" name="CuadroTexto 6">
+            <a:extLst>
+              <a:ext uri="{FF2B5EF4-FFF2-40B4-BE49-F238E27FC236}">
+                <a16:creationId xmlns:a16="http://schemas.microsoft.com/office/drawing/2014/main" id="{A985E777-DDCE-4DD2-8278-DEBB2A071293}"/>
+              </a:ext>
+            </a:extLst>
+          </p:cNvPr>
+          <p:cNvSpPr txBox="1"/>
+          <p:nvPr/>
+        </p:nvSpPr>
+        <p:spPr>
+          <a:xfrm>
+            <a:off x="5184001" y="3828201"/>
+            <a:ext cx="2669081" cy="369332"/>
+          </a:xfrm>
+          <a:prstGeom prst="rect">
+            <a:avLst/>
+          </a:prstGeom>
+          <a:noFill/>
+        </p:spPr>
+        <p:txBody>
+          <a:bodyPr wrap="square">
+            <a:spAutoFit/>
+          </a:bodyPr>
+          <a:lstStyle/>
+          <a:p>
+            <a:pPr algn="ctr"/>
+            <a:r>
+              <a:rPr lang="es-MX" b="1" i="0" dirty="0">
+                <a:effectLst/>
+                <a:latin typeface="Imprint MT Shadow" panose="04020605060303030202" pitchFamily="82" charset="0"/>
+              </a:rPr>
+              <a:t>Contexto: Intern</a:t>
+            </a:r>
+            <a:r>
+              <a:rPr lang="es-MX" b="1" dirty="0">
+                <a:latin typeface="Imprint MT Shadow" panose="04020605060303030202" pitchFamily="82" charset="0"/>
+              </a:rPr>
+              <a:t>acional</a:t>
+            </a:r>
+            <a:endParaRPr lang="es-CO" b="1" dirty="0">
+              <a:latin typeface="Imprint MT Shadow" panose="04020605060303030202" pitchFamily="82" charset="0"/>
+            </a:endParaRPr>
+          </a:p>
+        </p:txBody>
+      </p:sp>
+      <p:sp>
+        <p:nvSpPr>
+          <p:cNvPr id="8" name="CuadroTexto 7">
+            <a:extLst>
+              <a:ext uri="{FF2B5EF4-FFF2-40B4-BE49-F238E27FC236}">
+                <a16:creationId xmlns:a16="http://schemas.microsoft.com/office/drawing/2014/main" id="{A1D628A2-2118-4DF9-A7AD-4C9F218C6D22}"/>
+              </a:ext>
+            </a:extLst>
+          </p:cNvPr>
+          <p:cNvSpPr txBox="1"/>
+          <p:nvPr/>
+        </p:nvSpPr>
+        <p:spPr>
+          <a:xfrm>
+            <a:off x="4356848" y="4744496"/>
+            <a:ext cx="3845858" cy="646331"/>
+          </a:xfrm>
+          <a:prstGeom prst="rect">
+            <a:avLst/>
+          </a:prstGeom>
+          <a:noFill/>
+        </p:spPr>
+        <p:txBody>
+          <a:bodyPr wrap="square">
+            <a:spAutoFit/>
+          </a:bodyPr>
+          <a:lstStyle/>
+          <a:p>
+            <a:pPr algn="ctr"/>
+            <a:r>
+              <a:rPr lang="es-MX" b="1" dirty="0">
+                <a:latin typeface="Imprint MT Shadow" panose="04020605060303030202" pitchFamily="82" charset="0"/>
+              </a:rPr>
+              <a:t>Publicado por: Universidad Central del Sur, Changsha, China</a:t>
+            </a:r>
+            <a:endParaRPr lang="es-CO" b="1" dirty="0">
+              <a:latin typeface="Imprint MT Shadow" panose="04020605060303030202" pitchFamily="82" charset="0"/>
+            </a:endParaRPr>
+          </a:p>
+        </p:txBody>
+      </p:sp>
+    </p:spTree>
+    <p:extLst>
+      <p:ext uri="{BB962C8B-B14F-4D97-AF65-F5344CB8AC3E}">
+        <p14:creationId xmlns:p14="http://schemas.microsoft.com/office/powerpoint/2010/main" val="3026447573"/>
+      </p:ext>
+    </p:extLst>
+  </p:cSld>
+  <p:clrMapOvr>
+    <a:masterClrMapping/>
+  </p:clrMapOvr>
+</p:sld>
+</file>
+
 <file path=ppt/slides/slide2.xml><?xml version="1.0" encoding="utf-8"?>
 <p:sld xmlns:a="http://schemas.openxmlformats.org/drawingml/2006/main" xmlns:r="http://schemas.openxmlformats.org/officeDocument/2006/relationships" xmlns:p="http://schemas.openxmlformats.org/presentationml/2006/main">
   <p:cSld>
@@ -6507,6 +7243,3650 @@
     <p:extLst>
       <p:ext uri="{BB962C8B-B14F-4D97-AF65-F5344CB8AC3E}">
         <p14:creationId xmlns:p14="http://schemas.microsoft.com/office/powerpoint/2010/main" val="4288065630"/>
+      </p:ext>
+    </p:extLst>
+  </p:cSld>
+  <p:clrMapOvr>
+    <a:masterClrMapping/>
+  </p:clrMapOvr>
+</p:sld>
+</file>
+
+<file path=ppt/slides/slide20.xml><?xml version="1.0" encoding="utf-8"?>
+<p:sld xmlns:a="http://schemas.openxmlformats.org/drawingml/2006/main" xmlns:r="http://schemas.openxmlformats.org/officeDocument/2006/relationships" xmlns:p="http://schemas.openxmlformats.org/presentationml/2006/main">
+  <p:cSld>
+    <p:spTree>
+      <p:nvGrpSpPr>
+        <p:cNvPr id="1" name=""/>
+        <p:cNvGrpSpPr/>
+        <p:nvPr/>
+      </p:nvGrpSpPr>
+      <p:grpSpPr>
+        <a:xfrm>
+          <a:off x="0" y="0"/>
+          <a:ext cx="0" cy="0"/>
+          <a:chOff x="0" y="0"/>
+          <a:chExt cx="0" cy="0"/>
+        </a:xfrm>
+      </p:grpSpPr>
+      <p:pic>
+        <p:nvPicPr>
+          <p:cNvPr id="1026" name="Picture 2" descr="Fondo rojo con textura vintage continental, rojo, retro, continental png |  PNGWing">
+            <a:extLst>
+              <a:ext uri="{FF2B5EF4-FFF2-40B4-BE49-F238E27FC236}">
+                <a16:creationId xmlns:a16="http://schemas.microsoft.com/office/drawing/2014/main" id="{65048E78-8E01-4EC2-8FA0-C0F9A4B8A93A}"/>
+              </a:ext>
+            </a:extLst>
+          </p:cNvPr>
+          <p:cNvPicPr>
+            <a:picLocks noChangeAspect="1" noChangeArrowheads="1"/>
+          </p:cNvPicPr>
+          <p:nvPr/>
+        </p:nvPicPr>
+        <p:blipFill>
+          <a:blip r:embed="rId2">
+            <a:extLst>
+              <a:ext uri="{28A0092B-C50C-407E-A947-70E740481C1C}">
+                <a14:useLocalDpi xmlns:a14="http://schemas.microsoft.com/office/drawing/2010/main" val="0"/>
+              </a:ext>
+            </a:extLst>
+          </a:blip>
+          <a:srcRect/>
+          <a:stretch>
+            <a:fillRect/>
+          </a:stretch>
+        </p:blipFill>
+        <p:spPr bwMode="auto">
+          <a:xfrm>
+            <a:off x="0" y="0"/>
+            <a:ext cx="12192000" cy="6696635"/>
+          </a:xfrm>
+          <a:prstGeom prst="rect">
+            <a:avLst/>
+          </a:prstGeom>
+          <a:noFill/>
+          <a:extLst>
+            <a:ext uri="{909E8E84-426E-40DD-AFC4-6F175D3DCCD1}">
+              <a14:hiddenFill xmlns:a14="http://schemas.microsoft.com/office/drawing/2010/main">
+                <a:solidFill>
+                  <a:srgbClr val="FFFFFF"/>
+                </a:solidFill>
+              </a14:hiddenFill>
+            </a:ext>
+          </a:extLst>
+        </p:spPr>
+      </p:pic>
+      <p:pic>
+        <p:nvPicPr>
+          <p:cNvPr id="3" name="Picture 4" descr="tablero de madera en estilo de dibujos animados 8853564 PNG">
+            <a:extLst>
+              <a:ext uri="{FF2B5EF4-FFF2-40B4-BE49-F238E27FC236}">
+                <a16:creationId xmlns:a16="http://schemas.microsoft.com/office/drawing/2014/main" id="{EFC82DF3-927C-4A51-8E8B-E1DA5E532552}"/>
+              </a:ext>
+            </a:extLst>
+          </p:cNvPr>
+          <p:cNvPicPr>
+            <a:picLocks noChangeAspect="1" noChangeArrowheads="1"/>
+          </p:cNvPicPr>
+          <p:nvPr/>
+        </p:nvPicPr>
+        <p:blipFill>
+          <a:blip r:embed="rId3">
+            <a:extLst>
+              <a:ext uri="{28A0092B-C50C-407E-A947-70E740481C1C}">
+                <a14:useLocalDpi xmlns:a14="http://schemas.microsoft.com/office/drawing/2010/main" val="0"/>
+              </a:ext>
+            </a:extLst>
+          </a:blip>
+          <a:srcRect/>
+          <a:stretch>
+            <a:fillRect/>
+          </a:stretch>
+        </p:blipFill>
+        <p:spPr bwMode="auto">
+          <a:xfrm>
+            <a:off x="2133887" y="1790401"/>
+            <a:ext cx="7924222" cy="3912585"/>
+          </a:xfrm>
+          <a:prstGeom prst="rect">
+            <a:avLst/>
+          </a:prstGeom>
+          <a:noFill/>
+          <a:extLst>
+            <a:ext uri="{909E8E84-426E-40DD-AFC4-6F175D3DCCD1}">
+              <a14:hiddenFill xmlns:a14="http://schemas.microsoft.com/office/drawing/2010/main">
+                <a:solidFill>
+                  <a:srgbClr val="FFFFFF"/>
+                </a:solidFill>
+              </a14:hiddenFill>
+            </a:ext>
+          </a:extLst>
+        </p:spPr>
+      </p:pic>
+      <p:sp>
+        <p:nvSpPr>
+          <p:cNvPr id="46" name="CuadroTexto 45">
+            <a:extLst>
+              <a:ext uri="{FF2B5EF4-FFF2-40B4-BE49-F238E27FC236}">
+                <a16:creationId xmlns:a16="http://schemas.microsoft.com/office/drawing/2014/main" id="{738A3F34-A4B1-4DDC-BBE8-4F245C52246D}"/>
+              </a:ext>
+            </a:extLst>
+          </p:cNvPr>
+          <p:cNvSpPr txBox="1"/>
+          <p:nvPr/>
+        </p:nvSpPr>
+        <p:spPr>
+          <a:xfrm>
+            <a:off x="3698235" y="1953417"/>
+            <a:ext cx="4786859" cy="369332"/>
+          </a:xfrm>
+          <a:prstGeom prst="rect">
+            <a:avLst/>
+          </a:prstGeom>
+          <a:noFill/>
+        </p:spPr>
+        <p:txBody>
+          <a:bodyPr wrap="square">
+            <a:spAutoFit/>
+          </a:bodyPr>
+          <a:lstStyle/>
+          <a:p>
+            <a:pPr algn="ctr"/>
+            <a:r>
+              <a:rPr lang="es-MX" b="1" i="0" dirty="0">
+                <a:effectLst/>
+                <a:latin typeface="Imprint MT Shadow" panose="04020605060303030202" pitchFamily="82" charset="0"/>
+              </a:rPr>
+              <a:t>Titulo: </a:t>
+            </a:r>
+            <a:r>
+              <a:rPr lang="es-MX" b="1" i="0" dirty="0" err="1">
+                <a:effectLst/>
+                <a:latin typeface="Imprint MT Shadow" panose="04020605060303030202" pitchFamily="82" charset="0"/>
+              </a:rPr>
+              <a:t>Accounting</a:t>
+            </a:r>
+            <a:r>
+              <a:rPr lang="es-MX" b="1" i="0" dirty="0">
+                <a:effectLst/>
+                <a:latin typeface="Imprint MT Shadow" panose="04020605060303030202" pitchFamily="82" charset="0"/>
+              </a:rPr>
+              <a:t> and </a:t>
+            </a:r>
+            <a:r>
+              <a:rPr lang="es-MX" b="1" i="0" dirty="0" err="1">
+                <a:effectLst/>
+                <a:latin typeface="Imprint MT Shadow" panose="04020605060303030202" pitchFamily="82" charset="0"/>
+              </a:rPr>
+              <a:t>Finance</a:t>
+            </a:r>
+            <a:r>
+              <a:rPr lang="es-MX" b="1" i="0" dirty="0">
+                <a:effectLst/>
+                <a:latin typeface="Imprint MT Shadow" panose="04020605060303030202" pitchFamily="82" charset="0"/>
+              </a:rPr>
+              <a:t> </a:t>
+            </a:r>
+            <a:endParaRPr lang="es-CO" b="1" dirty="0">
+              <a:latin typeface="Imprint MT Shadow" panose="04020605060303030202" pitchFamily="82" charset="0"/>
+            </a:endParaRPr>
+          </a:p>
+        </p:txBody>
+      </p:sp>
+      <p:sp>
+        <p:nvSpPr>
+          <p:cNvPr id="47" name="CuadroTexto 46">
+            <a:extLst>
+              <a:ext uri="{FF2B5EF4-FFF2-40B4-BE49-F238E27FC236}">
+                <a16:creationId xmlns:a16="http://schemas.microsoft.com/office/drawing/2014/main" id="{7F7AE6D4-BF2C-4D6B-A3A4-07B373895627}"/>
+              </a:ext>
+            </a:extLst>
+          </p:cNvPr>
+          <p:cNvSpPr txBox="1"/>
+          <p:nvPr/>
+        </p:nvSpPr>
+        <p:spPr>
+          <a:xfrm>
+            <a:off x="5513557" y="379491"/>
+            <a:ext cx="1438572" cy="1015663"/>
+          </a:xfrm>
+          <a:prstGeom prst="rect">
+            <a:avLst/>
+          </a:prstGeom>
+          <a:noFill/>
+        </p:spPr>
+        <p:txBody>
+          <a:bodyPr wrap="square" rtlCol="0">
+            <a:spAutoFit/>
+          </a:bodyPr>
+          <a:lstStyle/>
+          <a:p>
+            <a:pPr algn="ctr"/>
+            <a:r>
+              <a:rPr lang="es-CO" sz="6000" b="1" dirty="0">
+                <a:solidFill>
+                  <a:srgbClr val="FFFF00"/>
+                </a:solidFill>
+                <a:latin typeface="Cooper Black" panose="0208090404030B020404" pitchFamily="18" charset="0"/>
+              </a:rPr>
+              <a:t>Q1</a:t>
+            </a:r>
+          </a:p>
+        </p:txBody>
+      </p:sp>
+      <p:sp>
+        <p:nvSpPr>
+          <p:cNvPr id="48" name="CuadroTexto 47">
+            <a:extLst>
+              <a:ext uri="{FF2B5EF4-FFF2-40B4-BE49-F238E27FC236}">
+                <a16:creationId xmlns:a16="http://schemas.microsoft.com/office/drawing/2014/main" id="{81A58E24-5C80-48F2-81EE-B2460C9B0C03}"/>
+              </a:ext>
+            </a:extLst>
+          </p:cNvPr>
+          <p:cNvSpPr txBox="1"/>
+          <p:nvPr/>
+        </p:nvSpPr>
+        <p:spPr>
+          <a:xfrm>
+            <a:off x="5184002" y="2911906"/>
+            <a:ext cx="1815323" cy="369332"/>
+          </a:xfrm>
+          <a:prstGeom prst="rect">
+            <a:avLst/>
+          </a:prstGeom>
+          <a:noFill/>
+        </p:spPr>
+        <p:txBody>
+          <a:bodyPr wrap="square">
+            <a:spAutoFit/>
+          </a:bodyPr>
+          <a:lstStyle/>
+          <a:p>
+            <a:pPr algn="ctr"/>
+            <a:r>
+              <a:rPr lang="es-MX" b="1" i="0" dirty="0">
+                <a:effectLst/>
+                <a:latin typeface="Imprint MT Shadow" panose="04020605060303030202" pitchFamily="82" charset="0"/>
+              </a:rPr>
+              <a:t>Categoría: Q1</a:t>
+            </a:r>
+            <a:endParaRPr lang="es-CO" b="1" dirty="0">
+              <a:latin typeface="Imprint MT Shadow" panose="04020605060303030202" pitchFamily="82" charset="0"/>
+            </a:endParaRPr>
+          </a:p>
+        </p:txBody>
+      </p:sp>
+      <p:sp>
+        <p:nvSpPr>
+          <p:cNvPr id="7" name="CuadroTexto 6">
+            <a:extLst>
+              <a:ext uri="{FF2B5EF4-FFF2-40B4-BE49-F238E27FC236}">
+                <a16:creationId xmlns:a16="http://schemas.microsoft.com/office/drawing/2014/main" id="{A985E777-DDCE-4DD2-8278-DEBB2A071293}"/>
+              </a:ext>
+            </a:extLst>
+          </p:cNvPr>
+          <p:cNvSpPr txBox="1"/>
+          <p:nvPr/>
+        </p:nvSpPr>
+        <p:spPr>
+          <a:xfrm>
+            <a:off x="5184001" y="3828201"/>
+            <a:ext cx="2669081" cy="369332"/>
+          </a:xfrm>
+          <a:prstGeom prst="rect">
+            <a:avLst/>
+          </a:prstGeom>
+          <a:noFill/>
+        </p:spPr>
+        <p:txBody>
+          <a:bodyPr wrap="square">
+            <a:spAutoFit/>
+          </a:bodyPr>
+          <a:lstStyle/>
+          <a:p>
+            <a:pPr algn="ctr"/>
+            <a:r>
+              <a:rPr lang="es-MX" b="1" i="0" dirty="0">
+                <a:effectLst/>
+                <a:latin typeface="Imprint MT Shadow" panose="04020605060303030202" pitchFamily="82" charset="0"/>
+              </a:rPr>
+              <a:t>Contexto: Intern</a:t>
+            </a:r>
+            <a:r>
+              <a:rPr lang="es-MX" b="1" dirty="0">
+                <a:latin typeface="Imprint MT Shadow" panose="04020605060303030202" pitchFamily="82" charset="0"/>
+              </a:rPr>
+              <a:t>acional</a:t>
+            </a:r>
+            <a:endParaRPr lang="es-CO" b="1" dirty="0">
+              <a:latin typeface="Imprint MT Shadow" panose="04020605060303030202" pitchFamily="82" charset="0"/>
+            </a:endParaRPr>
+          </a:p>
+        </p:txBody>
+      </p:sp>
+      <p:sp>
+        <p:nvSpPr>
+          <p:cNvPr id="8" name="CuadroTexto 7">
+            <a:extLst>
+              <a:ext uri="{FF2B5EF4-FFF2-40B4-BE49-F238E27FC236}">
+                <a16:creationId xmlns:a16="http://schemas.microsoft.com/office/drawing/2014/main" id="{A1D628A2-2118-4DF9-A7AD-4C9F218C6D22}"/>
+              </a:ext>
+            </a:extLst>
+          </p:cNvPr>
+          <p:cNvSpPr txBox="1"/>
+          <p:nvPr/>
+        </p:nvSpPr>
+        <p:spPr>
+          <a:xfrm>
+            <a:off x="4356848" y="4744496"/>
+            <a:ext cx="3845858" cy="646331"/>
+          </a:xfrm>
+          <a:prstGeom prst="rect">
+            <a:avLst/>
+          </a:prstGeom>
+          <a:noFill/>
+        </p:spPr>
+        <p:txBody>
+          <a:bodyPr wrap="square">
+            <a:spAutoFit/>
+          </a:bodyPr>
+          <a:lstStyle/>
+          <a:p>
+            <a:pPr algn="ctr"/>
+            <a:r>
+              <a:rPr lang="es-MX" b="1" dirty="0">
+                <a:latin typeface="Imprint MT Shadow" panose="04020605060303030202" pitchFamily="82" charset="0"/>
+              </a:rPr>
+              <a:t>Publicado por: John Wiley &amp; Sons </a:t>
+            </a:r>
+            <a:r>
+              <a:rPr lang="es-MX" b="1" dirty="0" err="1">
+                <a:latin typeface="Imprint MT Shadow" panose="04020605060303030202" pitchFamily="82" charset="0"/>
+              </a:rPr>
+              <a:t>Australi</a:t>
+            </a:r>
+            <a:endParaRPr lang="es-CO" b="1" dirty="0">
+              <a:latin typeface="Imprint MT Shadow" panose="04020605060303030202" pitchFamily="82" charset="0"/>
+            </a:endParaRPr>
+          </a:p>
+        </p:txBody>
+      </p:sp>
+    </p:spTree>
+    <p:extLst>
+      <p:ext uri="{BB962C8B-B14F-4D97-AF65-F5344CB8AC3E}">
+        <p14:creationId xmlns:p14="http://schemas.microsoft.com/office/powerpoint/2010/main" val="3548099041"/>
+      </p:ext>
+    </p:extLst>
+  </p:cSld>
+  <p:clrMapOvr>
+    <a:masterClrMapping/>
+  </p:clrMapOvr>
+</p:sld>
+</file>
+
+<file path=ppt/slides/slide21.xml><?xml version="1.0" encoding="utf-8"?>
+<p:sld xmlns:a="http://schemas.openxmlformats.org/drawingml/2006/main" xmlns:r="http://schemas.openxmlformats.org/officeDocument/2006/relationships" xmlns:p="http://schemas.openxmlformats.org/presentationml/2006/main">
+  <p:cSld>
+    <p:spTree>
+      <p:nvGrpSpPr>
+        <p:cNvPr id="1" name=""/>
+        <p:cNvGrpSpPr/>
+        <p:nvPr/>
+      </p:nvGrpSpPr>
+      <p:grpSpPr>
+        <a:xfrm>
+          <a:off x="0" y="0"/>
+          <a:ext cx="0" cy="0"/>
+          <a:chOff x="0" y="0"/>
+          <a:chExt cx="0" cy="0"/>
+        </a:xfrm>
+      </p:grpSpPr>
+      <p:pic>
+        <p:nvPicPr>
+          <p:cNvPr id="1026" name="Picture 2" descr="Fondo rojo con textura vintage continental, rojo, retro, continental png |  PNGWing">
+            <a:extLst>
+              <a:ext uri="{FF2B5EF4-FFF2-40B4-BE49-F238E27FC236}">
+                <a16:creationId xmlns:a16="http://schemas.microsoft.com/office/drawing/2014/main" id="{65048E78-8E01-4EC2-8FA0-C0F9A4B8A93A}"/>
+              </a:ext>
+            </a:extLst>
+          </p:cNvPr>
+          <p:cNvPicPr>
+            <a:picLocks noChangeAspect="1" noChangeArrowheads="1"/>
+          </p:cNvPicPr>
+          <p:nvPr/>
+        </p:nvPicPr>
+        <p:blipFill>
+          <a:blip r:embed="rId2">
+            <a:extLst>
+              <a:ext uri="{28A0092B-C50C-407E-A947-70E740481C1C}">
+                <a14:useLocalDpi xmlns:a14="http://schemas.microsoft.com/office/drawing/2010/main" val="0"/>
+              </a:ext>
+            </a:extLst>
+          </a:blip>
+          <a:srcRect/>
+          <a:stretch>
+            <a:fillRect/>
+          </a:stretch>
+        </p:blipFill>
+        <p:spPr bwMode="auto">
+          <a:xfrm>
+            <a:off x="0" y="0"/>
+            <a:ext cx="12192000" cy="6696635"/>
+          </a:xfrm>
+          <a:prstGeom prst="rect">
+            <a:avLst/>
+          </a:prstGeom>
+          <a:noFill/>
+          <a:extLst>
+            <a:ext uri="{909E8E84-426E-40DD-AFC4-6F175D3DCCD1}">
+              <a14:hiddenFill xmlns:a14="http://schemas.microsoft.com/office/drawing/2010/main">
+                <a:solidFill>
+                  <a:srgbClr val="FFFFFF"/>
+                </a:solidFill>
+              </a14:hiddenFill>
+            </a:ext>
+          </a:extLst>
+        </p:spPr>
+      </p:pic>
+      <p:pic>
+        <p:nvPicPr>
+          <p:cNvPr id="3" name="Picture 4" descr="tablero de madera en estilo de dibujos animados 8853564 PNG">
+            <a:extLst>
+              <a:ext uri="{FF2B5EF4-FFF2-40B4-BE49-F238E27FC236}">
+                <a16:creationId xmlns:a16="http://schemas.microsoft.com/office/drawing/2014/main" id="{EFC82DF3-927C-4A51-8E8B-E1DA5E532552}"/>
+              </a:ext>
+            </a:extLst>
+          </p:cNvPr>
+          <p:cNvPicPr>
+            <a:picLocks noChangeAspect="1" noChangeArrowheads="1"/>
+          </p:cNvPicPr>
+          <p:nvPr/>
+        </p:nvPicPr>
+        <p:blipFill>
+          <a:blip r:embed="rId3">
+            <a:extLst>
+              <a:ext uri="{28A0092B-C50C-407E-A947-70E740481C1C}">
+                <a14:useLocalDpi xmlns:a14="http://schemas.microsoft.com/office/drawing/2010/main" val="0"/>
+              </a:ext>
+            </a:extLst>
+          </a:blip>
+          <a:srcRect/>
+          <a:stretch>
+            <a:fillRect/>
+          </a:stretch>
+        </p:blipFill>
+        <p:spPr bwMode="auto">
+          <a:xfrm>
+            <a:off x="2133887" y="1790401"/>
+            <a:ext cx="7924222" cy="3912585"/>
+          </a:xfrm>
+          <a:prstGeom prst="rect">
+            <a:avLst/>
+          </a:prstGeom>
+          <a:noFill/>
+          <a:extLst>
+            <a:ext uri="{909E8E84-426E-40DD-AFC4-6F175D3DCCD1}">
+              <a14:hiddenFill xmlns:a14="http://schemas.microsoft.com/office/drawing/2010/main">
+                <a:solidFill>
+                  <a:srgbClr val="FFFFFF"/>
+                </a:solidFill>
+              </a14:hiddenFill>
+            </a:ext>
+          </a:extLst>
+        </p:spPr>
+      </p:pic>
+      <p:sp>
+        <p:nvSpPr>
+          <p:cNvPr id="46" name="CuadroTexto 45">
+            <a:extLst>
+              <a:ext uri="{FF2B5EF4-FFF2-40B4-BE49-F238E27FC236}">
+                <a16:creationId xmlns:a16="http://schemas.microsoft.com/office/drawing/2014/main" id="{738A3F34-A4B1-4DDC-BBE8-4F245C52246D}"/>
+              </a:ext>
+            </a:extLst>
+          </p:cNvPr>
+          <p:cNvSpPr txBox="1"/>
+          <p:nvPr/>
+        </p:nvSpPr>
+        <p:spPr>
+          <a:xfrm>
+            <a:off x="3698235" y="1953417"/>
+            <a:ext cx="4786859" cy="369332"/>
+          </a:xfrm>
+          <a:prstGeom prst="rect">
+            <a:avLst/>
+          </a:prstGeom>
+          <a:noFill/>
+        </p:spPr>
+        <p:txBody>
+          <a:bodyPr wrap="square">
+            <a:spAutoFit/>
+          </a:bodyPr>
+          <a:lstStyle/>
+          <a:p>
+            <a:pPr algn="ctr"/>
+            <a:r>
+              <a:rPr lang="es-MX" b="1" i="0" dirty="0">
+                <a:effectLst/>
+                <a:latin typeface="Imprint MT Shadow" panose="04020605060303030202" pitchFamily="82" charset="0"/>
+              </a:rPr>
+              <a:t>Titulo: </a:t>
+            </a:r>
+            <a:r>
+              <a:rPr lang="es-MX" b="1" i="0" dirty="0" err="1">
+                <a:effectLst/>
+                <a:latin typeface="Imprint MT Shadow" panose="04020605060303030202" pitchFamily="82" charset="0"/>
+              </a:rPr>
+              <a:t>Accounting</a:t>
+            </a:r>
+            <a:r>
+              <a:rPr lang="es-MX" b="1" i="0" dirty="0">
+                <a:effectLst/>
+                <a:latin typeface="Imprint MT Shadow" panose="04020605060303030202" pitchFamily="82" charset="0"/>
+              </a:rPr>
+              <a:t> and Business </a:t>
+            </a:r>
+            <a:r>
+              <a:rPr lang="es-MX" b="1" i="0" dirty="0" err="1">
+                <a:effectLst/>
+                <a:latin typeface="Imprint MT Shadow" panose="04020605060303030202" pitchFamily="82" charset="0"/>
+              </a:rPr>
+              <a:t>Research</a:t>
+            </a:r>
+            <a:endParaRPr lang="es-CO" b="1" dirty="0">
+              <a:latin typeface="Imprint MT Shadow" panose="04020605060303030202" pitchFamily="82" charset="0"/>
+            </a:endParaRPr>
+          </a:p>
+        </p:txBody>
+      </p:sp>
+      <p:sp>
+        <p:nvSpPr>
+          <p:cNvPr id="47" name="CuadroTexto 46">
+            <a:extLst>
+              <a:ext uri="{FF2B5EF4-FFF2-40B4-BE49-F238E27FC236}">
+                <a16:creationId xmlns:a16="http://schemas.microsoft.com/office/drawing/2014/main" id="{7F7AE6D4-BF2C-4D6B-A3A4-07B373895627}"/>
+              </a:ext>
+            </a:extLst>
+          </p:cNvPr>
+          <p:cNvSpPr txBox="1"/>
+          <p:nvPr/>
+        </p:nvSpPr>
+        <p:spPr>
+          <a:xfrm>
+            <a:off x="5513557" y="379491"/>
+            <a:ext cx="1438572" cy="1015663"/>
+          </a:xfrm>
+          <a:prstGeom prst="rect">
+            <a:avLst/>
+          </a:prstGeom>
+          <a:noFill/>
+        </p:spPr>
+        <p:txBody>
+          <a:bodyPr wrap="square" rtlCol="0">
+            <a:spAutoFit/>
+          </a:bodyPr>
+          <a:lstStyle/>
+          <a:p>
+            <a:pPr algn="ctr"/>
+            <a:r>
+              <a:rPr lang="es-CO" sz="6000" b="1" dirty="0">
+                <a:solidFill>
+                  <a:srgbClr val="FFFF00"/>
+                </a:solidFill>
+                <a:latin typeface="Cooper Black" panose="0208090404030B020404" pitchFamily="18" charset="0"/>
+              </a:rPr>
+              <a:t>Q2</a:t>
+            </a:r>
+          </a:p>
+        </p:txBody>
+      </p:sp>
+      <p:sp>
+        <p:nvSpPr>
+          <p:cNvPr id="48" name="CuadroTexto 47">
+            <a:extLst>
+              <a:ext uri="{FF2B5EF4-FFF2-40B4-BE49-F238E27FC236}">
+                <a16:creationId xmlns:a16="http://schemas.microsoft.com/office/drawing/2014/main" id="{81A58E24-5C80-48F2-81EE-B2460C9B0C03}"/>
+              </a:ext>
+            </a:extLst>
+          </p:cNvPr>
+          <p:cNvSpPr txBox="1"/>
+          <p:nvPr/>
+        </p:nvSpPr>
+        <p:spPr>
+          <a:xfrm>
+            <a:off x="5184002" y="2911906"/>
+            <a:ext cx="1815323" cy="369332"/>
+          </a:xfrm>
+          <a:prstGeom prst="rect">
+            <a:avLst/>
+          </a:prstGeom>
+          <a:noFill/>
+        </p:spPr>
+        <p:txBody>
+          <a:bodyPr wrap="square">
+            <a:spAutoFit/>
+          </a:bodyPr>
+          <a:lstStyle/>
+          <a:p>
+            <a:pPr algn="ctr"/>
+            <a:r>
+              <a:rPr lang="es-MX" b="1" i="0" dirty="0">
+                <a:effectLst/>
+                <a:latin typeface="Imprint MT Shadow" panose="04020605060303030202" pitchFamily="82" charset="0"/>
+              </a:rPr>
+              <a:t>Categoría: Q2</a:t>
+            </a:r>
+            <a:endParaRPr lang="es-CO" b="1" dirty="0">
+              <a:latin typeface="Imprint MT Shadow" panose="04020605060303030202" pitchFamily="82" charset="0"/>
+            </a:endParaRPr>
+          </a:p>
+        </p:txBody>
+      </p:sp>
+      <p:sp>
+        <p:nvSpPr>
+          <p:cNvPr id="7" name="CuadroTexto 6">
+            <a:extLst>
+              <a:ext uri="{FF2B5EF4-FFF2-40B4-BE49-F238E27FC236}">
+                <a16:creationId xmlns:a16="http://schemas.microsoft.com/office/drawing/2014/main" id="{A985E777-DDCE-4DD2-8278-DEBB2A071293}"/>
+              </a:ext>
+            </a:extLst>
+          </p:cNvPr>
+          <p:cNvSpPr txBox="1"/>
+          <p:nvPr/>
+        </p:nvSpPr>
+        <p:spPr>
+          <a:xfrm>
+            <a:off x="5184001" y="3828201"/>
+            <a:ext cx="2669081" cy="369332"/>
+          </a:xfrm>
+          <a:prstGeom prst="rect">
+            <a:avLst/>
+          </a:prstGeom>
+          <a:noFill/>
+        </p:spPr>
+        <p:txBody>
+          <a:bodyPr wrap="square">
+            <a:spAutoFit/>
+          </a:bodyPr>
+          <a:lstStyle/>
+          <a:p>
+            <a:pPr algn="ctr"/>
+            <a:r>
+              <a:rPr lang="es-MX" b="1" i="0" dirty="0">
+                <a:effectLst/>
+                <a:latin typeface="Imprint MT Shadow" panose="04020605060303030202" pitchFamily="82" charset="0"/>
+              </a:rPr>
+              <a:t>Contexto: Intern</a:t>
+            </a:r>
+            <a:r>
+              <a:rPr lang="es-MX" b="1" dirty="0">
+                <a:latin typeface="Imprint MT Shadow" panose="04020605060303030202" pitchFamily="82" charset="0"/>
+              </a:rPr>
+              <a:t>acional</a:t>
+            </a:r>
+            <a:endParaRPr lang="es-CO" b="1" dirty="0">
+              <a:latin typeface="Imprint MT Shadow" panose="04020605060303030202" pitchFamily="82" charset="0"/>
+            </a:endParaRPr>
+          </a:p>
+        </p:txBody>
+      </p:sp>
+      <p:sp>
+        <p:nvSpPr>
+          <p:cNvPr id="8" name="CuadroTexto 7">
+            <a:extLst>
+              <a:ext uri="{FF2B5EF4-FFF2-40B4-BE49-F238E27FC236}">
+                <a16:creationId xmlns:a16="http://schemas.microsoft.com/office/drawing/2014/main" id="{A1D628A2-2118-4DF9-A7AD-4C9F218C6D22}"/>
+              </a:ext>
+            </a:extLst>
+          </p:cNvPr>
+          <p:cNvSpPr txBox="1"/>
+          <p:nvPr/>
+        </p:nvSpPr>
+        <p:spPr>
+          <a:xfrm>
+            <a:off x="2985247" y="4744496"/>
+            <a:ext cx="6158460" cy="646331"/>
+          </a:xfrm>
+          <a:prstGeom prst="rect">
+            <a:avLst/>
+          </a:prstGeom>
+          <a:noFill/>
+        </p:spPr>
+        <p:txBody>
+          <a:bodyPr wrap="square">
+            <a:spAutoFit/>
+          </a:bodyPr>
+          <a:lstStyle/>
+          <a:p>
+            <a:pPr algn="ctr"/>
+            <a:r>
+              <a:rPr lang="es-MX" b="1" dirty="0">
+                <a:latin typeface="Imprint MT Shadow" panose="04020605060303030202" pitchFamily="82" charset="0"/>
+              </a:rPr>
+              <a:t>Publicado por: Mark </a:t>
+            </a:r>
+            <a:r>
+              <a:rPr lang="es-MX" b="1" dirty="0" err="1">
+                <a:latin typeface="Imprint MT Shadow" panose="04020605060303030202" pitchFamily="82" charset="0"/>
+              </a:rPr>
+              <a:t>Clatworthy</a:t>
+            </a:r>
+            <a:r>
+              <a:rPr lang="es-MX" b="1" dirty="0">
+                <a:latin typeface="Imprint MT Shadow" panose="04020605060303030202" pitchFamily="82" charset="0"/>
+              </a:rPr>
+              <a:t>, Juan Manuel García Lara, </a:t>
+            </a:r>
+          </a:p>
+          <a:p>
+            <a:pPr algn="ctr"/>
+            <a:r>
+              <a:rPr lang="es-MX" b="1" dirty="0">
+                <a:latin typeface="Imprint MT Shadow" panose="04020605060303030202" pitchFamily="82" charset="0"/>
+              </a:rPr>
+              <a:t>Edward Lee</a:t>
+            </a:r>
+            <a:endParaRPr lang="es-CO" b="1" dirty="0">
+              <a:latin typeface="Imprint MT Shadow" panose="04020605060303030202" pitchFamily="82" charset="0"/>
+            </a:endParaRPr>
+          </a:p>
+        </p:txBody>
+      </p:sp>
+    </p:spTree>
+    <p:extLst>
+      <p:ext uri="{BB962C8B-B14F-4D97-AF65-F5344CB8AC3E}">
+        <p14:creationId xmlns:p14="http://schemas.microsoft.com/office/powerpoint/2010/main" val="814824414"/>
+      </p:ext>
+    </p:extLst>
+  </p:cSld>
+  <p:clrMapOvr>
+    <a:masterClrMapping/>
+  </p:clrMapOvr>
+</p:sld>
+</file>
+
+<file path=ppt/slides/slide22.xml><?xml version="1.0" encoding="utf-8"?>
+<p:sld xmlns:a="http://schemas.openxmlformats.org/drawingml/2006/main" xmlns:r="http://schemas.openxmlformats.org/officeDocument/2006/relationships" xmlns:p="http://schemas.openxmlformats.org/presentationml/2006/main">
+  <p:cSld>
+    <p:spTree>
+      <p:nvGrpSpPr>
+        <p:cNvPr id="1" name=""/>
+        <p:cNvGrpSpPr/>
+        <p:nvPr/>
+      </p:nvGrpSpPr>
+      <p:grpSpPr>
+        <a:xfrm>
+          <a:off x="0" y="0"/>
+          <a:ext cx="0" cy="0"/>
+          <a:chOff x="0" y="0"/>
+          <a:chExt cx="0" cy="0"/>
+        </a:xfrm>
+      </p:grpSpPr>
+      <p:pic>
+        <p:nvPicPr>
+          <p:cNvPr id="1026" name="Picture 2" descr="Fondo rojo con textura vintage continental, rojo, retro, continental png |  PNGWing">
+            <a:extLst>
+              <a:ext uri="{FF2B5EF4-FFF2-40B4-BE49-F238E27FC236}">
+                <a16:creationId xmlns:a16="http://schemas.microsoft.com/office/drawing/2014/main" id="{65048E78-8E01-4EC2-8FA0-C0F9A4B8A93A}"/>
+              </a:ext>
+            </a:extLst>
+          </p:cNvPr>
+          <p:cNvPicPr>
+            <a:picLocks noChangeAspect="1" noChangeArrowheads="1"/>
+          </p:cNvPicPr>
+          <p:nvPr/>
+        </p:nvPicPr>
+        <p:blipFill>
+          <a:blip r:embed="rId2">
+            <a:extLst>
+              <a:ext uri="{28A0092B-C50C-407E-A947-70E740481C1C}">
+                <a14:useLocalDpi xmlns:a14="http://schemas.microsoft.com/office/drawing/2010/main" val="0"/>
+              </a:ext>
+            </a:extLst>
+          </a:blip>
+          <a:srcRect/>
+          <a:stretch>
+            <a:fillRect/>
+          </a:stretch>
+        </p:blipFill>
+        <p:spPr bwMode="auto">
+          <a:xfrm>
+            <a:off x="0" y="0"/>
+            <a:ext cx="12192000" cy="6696635"/>
+          </a:xfrm>
+          <a:prstGeom prst="rect">
+            <a:avLst/>
+          </a:prstGeom>
+          <a:noFill/>
+          <a:extLst>
+            <a:ext uri="{909E8E84-426E-40DD-AFC4-6F175D3DCCD1}">
+              <a14:hiddenFill xmlns:a14="http://schemas.microsoft.com/office/drawing/2010/main">
+                <a:solidFill>
+                  <a:srgbClr val="FFFFFF"/>
+                </a:solidFill>
+              </a14:hiddenFill>
+            </a:ext>
+          </a:extLst>
+        </p:spPr>
+      </p:pic>
+      <p:pic>
+        <p:nvPicPr>
+          <p:cNvPr id="3" name="Picture 4" descr="tablero de madera en estilo de dibujos animados 8853564 PNG">
+            <a:extLst>
+              <a:ext uri="{FF2B5EF4-FFF2-40B4-BE49-F238E27FC236}">
+                <a16:creationId xmlns:a16="http://schemas.microsoft.com/office/drawing/2014/main" id="{EFC82DF3-927C-4A51-8E8B-E1DA5E532552}"/>
+              </a:ext>
+            </a:extLst>
+          </p:cNvPr>
+          <p:cNvPicPr>
+            <a:picLocks noChangeAspect="1" noChangeArrowheads="1"/>
+          </p:cNvPicPr>
+          <p:nvPr/>
+        </p:nvPicPr>
+        <p:blipFill>
+          <a:blip r:embed="rId3">
+            <a:extLst>
+              <a:ext uri="{28A0092B-C50C-407E-A947-70E740481C1C}">
+                <a14:useLocalDpi xmlns:a14="http://schemas.microsoft.com/office/drawing/2010/main" val="0"/>
+              </a:ext>
+            </a:extLst>
+          </a:blip>
+          <a:srcRect/>
+          <a:stretch>
+            <a:fillRect/>
+          </a:stretch>
+        </p:blipFill>
+        <p:spPr bwMode="auto">
+          <a:xfrm>
+            <a:off x="2133887" y="1790401"/>
+            <a:ext cx="7924222" cy="3912585"/>
+          </a:xfrm>
+          <a:prstGeom prst="rect">
+            <a:avLst/>
+          </a:prstGeom>
+          <a:noFill/>
+          <a:extLst>
+            <a:ext uri="{909E8E84-426E-40DD-AFC4-6F175D3DCCD1}">
+              <a14:hiddenFill xmlns:a14="http://schemas.microsoft.com/office/drawing/2010/main">
+                <a:solidFill>
+                  <a:srgbClr val="FFFFFF"/>
+                </a:solidFill>
+              </a14:hiddenFill>
+            </a:ext>
+          </a:extLst>
+        </p:spPr>
+      </p:pic>
+      <p:sp>
+        <p:nvSpPr>
+          <p:cNvPr id="46" name="CuadroTexto 45">
+            <a:extLst>
+              <a:ext uri="{FF2B5EF4-FFF2-40B4-BE49-F238E27FC236}">
+                <a16:creationId xmlns:a16="http://schemas.microsoft.com/office/drawing/2014/main" id="{738A3F34-A4B1-4DDC-BBE8-4F245C52246D}"/>
+              </a:ext>
+            </a:extLst>
+          </p:cNvPr>
+          <p:cNvSpPr txBox="1"/>
+          <p:nvPr/>
+        </p:nvSpPr>
+        <p:spPr>
+          <a:xfrm>
+            <a:off x="3698235" y="1953417"/>
+            <a:ext cx="4786859" cy="369332"/>
+          </a:xfrm>
+          <a:prstGeom prst="rect">
+            <a:avLst/>
+          </a:prstGeom>
+          <a:noFill/>
+        </p:spPr>
+        <p:txBody>
+          <a:bodyPr wrap="square">
+            <a:spAutoFit/>
+          </a:bodyPr>
+          <a:lstStyle/>
+          <a:p>
+            <a:pPr algn="ctr"/>
+            <a:r>
+              <a:rPr lang="es-MX" b="1" i="0" dirty="0">
+                <a:effectLst/>
+                <a:latin typeface="Imprint MT Shadow" panose="04020605060303030202" pitchFamily="82" charset="0"/>
+              </a:rPr>
+              <a:t>Titulo: </a:t>
+            </a:r>
+            <a:r>
+              <a:rPr lang="es-MX" b="1" i="0" dirty="0" err="1">
+                <a:effectLst/>
+                <a:latin typeface="Imprint MT Shadow" panose="04020605060303030202" pitchFamily="82" charset="0"/>
+              </a:rPr>
+              <a:t>Accreditation</a:t>
+            </a:r>
+            <a:r>
+              <a:rPr lang="es-MX" b="1" i="0" dirty="0">
+                <a:effectLst/>
+                <a:latin typeface="Imprint MT Shadow" panose="04020605060303030202" pitchFamily="82" charset="0"/>
+              </a:rPr>
+              <a:t> and </a:t>
+            </a:r>
+            <a:r>
+              <a:rPr lang="es-MX" b="1" i="0" dirty="0" err="1">
+                <a:effectLst/>
+                <a:latin typeface="Imprint MT Shadow" panose="04020605060303030202" pitchFamily="82" charset="0"/>
+              </a:rPr>
+              <a:t>Quality</a:t>
+            </a:r>
+            <a:r>
+              <a:rPr lang="es-MX" b="1" i="0" dirty="0">
+                <a:effectLst/>
+                <a:latin typeface="Imprint MT Shadow" panose="04020605060303030202" pitchFamily="82" charset="0"/>
+              </a:rPr>
+              <a:t> </a:t>
+            </a:r>
+            <a:r>
+              <a:rPr lang="es-MX" b="1" i="0" dirty="0" err="1">
+                <a:effectLst/>
+                <a:latin typeface="Imprint MT Shadow" panose="04020605060303030202" pitchFamily="82" charset="0"/>
+              </a:rPr>
+              <a:t>Assurance</a:t>
+            </a:r>
+            <a:endParaRPr lang="es-CO" b="1" dirty="0">
+              <a:latin typeface="Imprint MT Shadow" panose="04020605060303030202" pitchFamily="82" charset="0"/>
+            </a:endParaRPr>
+          </a:p>
+        </p:txBody>
+      </p:sp>
+      <p:sp>
+        <p:nvSpPr>
+          <p:cNvPr id="47" name="CuadroTexto 46">
+            <a:extLst>
+              <a:ext uri="{FF2B5EF4-FFF2-40B4-BE49-F238E27FC236}">
+                <a16:creationId xmlns:a16="http://schemas.microsoft.com/office/drawing/2014/main" id="{7F7AE6D4-BF2C-4D6B-A3A4-07B373895627}"/>
+              </a:ext>
+            </a:extLst>
+          </p:cNvPr>
+          <p:cNvSpPr txBox="1"/>
+          <p:nvPr/>
+        </p:nvSpPr>
+        <p:spPr>
+          <a:xfrm>
+            <a:off x="5513557" y="379491"/>
+            <a:ext cx="1438572" cy="1015663"/>
+          </a:xfrm>
+          <a:prstGeom prst="rect">
+            <a:avLst/>
+          </a:prstGeom>
+          <a:noFill/>
+        </p:spPr>
+        <p:txBody>
+          <a:bodyPr wrap="square" rtlCol="0">
+            <a:spAutoFit/>
+          </a:bodyPr>
+          <a:lstStyle/>
+          <a:p>
+            <a:pPr algn="ctr"/>
+            <a:r>
+              <a:rPr lang="es-CO" sz="6000" b="1" dirty="0">
+                <a:solidFill>
+                  <a:srgbClr val="FFFF00"/>
+                </a:solidFill>
+                <a:latin typeface="Cooper Black" panose="0208090404030B020404" pitchFamily="18" charset="0"/>
+              </a:rPr>
+              <a:t>Q2</a:t>
+            </a:r>
+          </a:p>
+        </p:txBody>
+      </p:sp>
+      <p:sp>
+        <p:nvSpPr>
+          <p:cNvPr id="48" name="CuadroTexto 47">
+            <a:extLst>
+              <a:ext uri="{FF2B5EF4-FFF2-40B4-BE49-F238E27FC236}">
+                <a16:creationId xmlns:a16="http://schemas.microsoft.com/office/drawing/2014/main" id="{81A58E24-5C80-48F2-81EE-B2460C9B0C03}"/>
+              </a:ext>
+            </a:extLst>
+          </p:cNvPr>
+          <p:cNvSpPr txBox="1"/>
+          <p:nvPr/>
+        </p:nvSpPr>
+        <p:spPr>
+          <a:xfrm>
+            <a:off x="5184002" y="2911906"/>
+            <a:ext cx="1815323" cy="369332"/>
+          </a:xfrm>
+          <a:prstGeom prst="rect">
+            <a:avLst/>
+          </a:prstGeom>
+          <a:noFill/>
+        </p:spPr>
+        <p:txBody>
+          <a:bodyPr wrap="square">
+            <a:spAutoFit/>
+          </a:bodyPr>
+          <a:lstStyle/>
+          <a:p>
+            <a:pPr algn="ctr"/>
+            <a:r>
+              <a:rPr lang="es-MX" b="1" i="0" dirty="0">
+                <a:effectLst/>
+                <a:latin typeface="Imprint MT Shadow" panose="04020605060303030202" pitchFamily="82" charset="0"/>
+              </a:rPr>
+              <a:t>Categoría: Q2</a:t>
+            </a:r>
+            <a:endParaRPr lang="es-CO" b="1" dirty="0">
+              <a:latin typeface="Imprint MT Shadow" panose="04020605060303030202" pitchFamily="82" charset="0"/>
+            </a:endParaRPr>
+          </a:p>
+        </p:txBody>
+      </p:sp>
+      <p:sp>
+        <p:nvSpPr>
+          <p:cNvPr id="7" name="CuadroTexto 6">
+            <a:extLst>
+              <a:ext uri="{FF2B5EF4-FFF2-40B4-BE49-F238E27FC236}">
+                <a16:creationId xmlns:a16="http://schemas.microsoft.com/office/drawing/2014/main" id="{A985E777-DDCE-4DD2-8278-DEBB2A071293}"/>
+              </a:ext>
+            </a:extLst>
+          </p:cNvPr>
+          <p:cNvSpPr txBox="1"/>
+          <p:nvPr/>
+        </p:nvSpPr>
+        <p:spPr>
+          <a:xfrm>
+            <a:off x="5184001" y="3828201"/>
+            <a:ext cx="2669081" cy="369332"/>
+          </a:xfrm>
+          <a:prstGeom prst="rect">
+            <a:avLst/>
+          </a:prstGeom>
+          <a:noFill/>
+        </p:spPr>
+        <p:txBody>
+          <a:bodyPr wrap="square">
+            <a:spAutoFit/>
+          </a:bodyPr>
+          <a:lstStyle/>
+          <a:p>
+            <a:pPr algn="ctr"/>
+            <a:r>
+              <a:rPr lang="es-MX" b="1" i="0" dirty="0">
+                <a:effectLst/>
+                <a:latin typeface="Imprint MT Shadow" panose="04020605060303030202" pitchFamily="82" charset="0"/>
+              </a:rPr>
+              <a:t>Contexto: Intern</a:t>
+            </a:r>
+            <a:r>
+              <a:rPr lang="es-MX" b="1" dirty="0">
+                <a:latin typeface="Imprint MT Shadow" panose="04020605060303030202" pitchFamily="82" charset="0"/>
+              </a:rPr>
+              <a:t>acional</a:t>
+            </a:r>
+            <a:endParaRPr lang="es-CO" b="1" dirty="0">
+              <a:latin typeface="Imprint MT Shadow" panose="04020605060303030202" pitchFamily="82" charset="0"/>
+            </a:endParaRPr>
+          </a:p>
+        </p:txBody>
+      </p:sp>
+      <p:sp>
+        <p:nvSpPr>
+          <p:cNvPr id="8" name="CuadroTexto 7">
+            <a:extLst>
+              <a:ext uri="{FF2B5EF4-FFF2-40B4-BE49-F238E27FC236}">
+                <a16:creationId xmlns:a16="http://schemas.microsoft.com/office/drawing/2014/main" id="{A1D628A2-2118-4DF9-A7AD-4C9F218C6D22}"/>
+              </a:ext>
+            </a:extLst>
+          </p:cNvPr>
+          <p:cNvSpPr txBox="1"/>
+          <p:nvPr/>
+        </p:nvSpPr>
+        <p:spPr>
+          <a:xfrm>
+            <a:off x="2985247" y="4744496"/>
+            <a:ext cx="6158460" cy="369332"/>
+          </a:xfrm>
+          <a:prstGeom prst="rect">
+            <a:avLst/>
+          </a:prstGeom>
+          <a:noFill/>
+        </p:spPr>
+        <p:txBody>
+          <a:bodyPr wrap="square">
+            <a:spAutoFit/>
+          </a:bodyPr>
+          <a:lstStyle/>
+          <a:p>
+            <a:pPr algn="ctr"/>
+            <a:r>
+              <a:rPr lang="es-MX" b="1" dirty="0">
+                <a:latin typeface="Imprint MT Shadow" panose="04020605060303030202" pitchFamily="82" charset="0"/>
+              </a:rPr>
+              <a:t>Publicado por: Stephen L. R. </a:t>
+            </a:r>
+            <a:r>
+              <a:rPr lang="es-MX" b="1" dirty="0" err="1">
+                <a:latin typeface="Imprint MT Shadow" panose="04020605060303030202" pitchFamily="82" charset="0"/>
+              </a:rPr>
+              <a:t>Ellisson</a:t>
+            </a:r>
+            <a:endParaRPr lang="es-CO" b="1" dirty="0">
+              <a:latin typeface="Imprint MT Shadow" panose="04020605060303030202" pitchFamily="82" charset="0"/>
+            </a:endParaRPr>
+          </a:p>
+        </p:txBody>
+      </p:sp>
+    </p:spTree>
+    <p:extLst>
+      <p:ext uri="{BB962C8B-B14F-4D97-AF65-F5344CB8AC3E}">
+        <p14:creationId xmlns:p14="http://schemas.microsoft.com/office/powerpoint/2010/main" val="2306909173"/>
+      </p:ext>
+    </p:extLst>
+  </p:cSld>
+  <p:clrMapOvr>
+    <a:masterClrMapping/>
+  </p:clrMapOvr>
+</p:sld>
+</file>
+
+<file path=ppt/slides/slide23.xml><?xml version="1.0" encoding="utf-8"?>
+<p:sld xmlns:a="http://schemas.openxmlformats.org/drawingml/2006/main" xmlns:r="http://schemas.openxmlformats.org/officeDocument/2006/relationships" xmlns:p="http://schemas.openxmlformats.org/presentationml/2006/main">
+  <p:cSld>
+    <p:spTree>
+      <p:nvGrpSpPr>
+        <p:cNvPr id="1" name=""/>
+        <p:cNvGrpSpPr/>
+        <p:nvPr/>
+      </p:nvGrpSpPr>
+      <p:grpSpPr>
+        <a:xfrm>
+          <a:off x="0" y="0"/>
+          <a:ext cx="0" cy="0"/>
+          <a:chOff x="0" y="0"/>
+          <a:chExt cx="0" cy="0"/>
+        </a:xfrm>
+      </p:grpSpPr>
+      <p:pic>
+        <p:nvPicPr>
+          <p:cNvPr id="1026" name="Picture 2" descr="Fondo rojo con textura vintage continental, rojo, retro, continental png |  PNGWing">
+            <a:extLst>
+              <a:ext uri="{FF2B5EF4-FFF2-40B4-BE49-F238E27FC236}">
+                <a16:creationId xmlns:a16="http://schemas.microsoft.com/office/drawing/2014/main" id="{65048E78-8E01-4EC2-8FA0-C0F9A4B8A93A}"/>
+              </a:ext>
+            </a:extLst>
+          </p:cNvPr>
+          <p:cNvPicPr>
+            <a:picLocks noChangeAspect="1" noChangeArrowheads="1"/>
+          </p:cNvPicPr>
+          <p:nvPr/>
+        </p:nvPicPr>
+        <p:blipFill>
+          <a:blip r:embed="rId2">
+            <a:extLst>
+              <a:ext uri="{28A0092B-C50C-407E-A947-70E740481C1C}">
+                <a14:useLocalDpi xmlns:a14="http://schemas.microsoft.com/office/drawing/2010/main" val="0"/>
+              </a:ext>
+            </a:extLst>
+          </a:blip>
+          <a:srcRect/>
+          <a:stretch>
+            <a:fillRect/>
+          </a:stretch>
+        </p:blipFill>
+        <p:spPr bwMode="auto">
+          <a:xfrm>
+            <a:off x="0" y="0"/>
+            <a:ext cx="12192000" cy="6696635"/>
+          </a:xfrm>
+          <a:prstGeom prst="rect">
+            <a:avLst/>
+          </a:prstGeom>
+          <a:noFill/>
+          <a:extLst>
+            <a:ext uri="{909E8E84-426E-40DD-AFC4-6F175D3DCCD1}">
+              <a14:hiddenFill xmlns:a14="http://schemas.microsoft.com/office/drawing/2010/main">
+                <a:solidFill>
+                  <a:srgbClr val="FFFFFF"/>
+                </a:solidFill>
+              </a14:hiddenFill>
+            </a:ext>
+          </a:extLst>
+        </p:spPr>
+      </p:pic>
+      <p:pic>
+        <p:nvPicPr>
+          <p:cNvPr id="3" name="Picture 4" descr="tablero de madera en estilo de dibujos animados 8853564 PNG">
+            <a:extLst>
+              <a:ext uri="{FF2B5EF4-FFF2-40B4-BE49-F238E27FC236}">
+                <a16:creationId xmlns:a16="http://schemas.microsoft.com/office/drawing/2014/main" id="{EFC82DF3-927C-4A51-8E8B-E1DA5E532552}"/>
+              </a:ext>
+            </a:extLst>
+          </p:cNvPr>
+          <p:cNvPicPr>
+            <a:picLocks noChangeAspect="1" noChangeArrowheads="1"/>
+          </p:cNvPicPr>
+          <p:nvPr/>
+        </p:nvPicPr>
+        <p:blipFill>
+          <a:blip r:embed="rId3">
+            <a:extLst>
+              <a:ext uri="{28A0092B-C50C-407E-A947-70E740481C1C}">
+                <a14:useLocalDpi xmlns:a14="http://schemas.microsoft.com/office/drawing/2010/main" val="0"/>
+              </a:ext>
+            </a:extLst>
+          </a:blip>
+          <a:srcRect/>
+          <a:stretch>
+            <a:fillRect/>
+          </a:stretch>
+        </p:blipFill>
+        <p:spPr bwMode="auto">
+          <a:xfrm>
+            <a:off x="2133887" y="1790401"/>
+            <a:ext cx="7924222" cy="3912585"/>
+          </a:xfrm>
+          <a:prstGeom prst="rect">
+            <a:avLst/>
+          </a:prstGeom>
+          <a:noFill/>
+          <a:extLst>
+            <a:ext uri="{909E8E84-426E-40DD-AFC4-6F175D3DCCD1}">
+              <a14:hiddenFill xmlns:a14="http://schemas.microsoft.com/office/drawing/2010/main">
+                <a:solidFill>
+                  <a:srgbClr val="FFFFFF"/>
+                </a:solidFill>
+              </a14:hiddenFill>
+            </a:ext>
+          </a:extLst>
+        </p:spPr>
+      </p:pic>
+      <p:sp>
+        <p:nvSpPr>
+          <p:cNvPr id="46" name="CuadroTexto 45">
+            <a:extLst>
+              <a:ext uri="{FF2B5EF4-FFF2-40B4-BE49-F238E27FC236}">
+                <a16:creationId xmlns:a16="http://schemas.microsoft.com/office/drawing/2014/main" id="{738A3F34-A4B1-4DDC-BBE8-4F245C52246D}"/>
+              </a:ext>
+            </a:extLst>
+          </p:cNvPr>
+          <p:cNvSpPr txBox="1"/>
+          <p:nvPr/>
+        </p:nvSpPr>
+        <p:spPr>
+          <a:xfrm>
+            <a:off x="3698235" y="1953417"/>
+            <a:ext cx="4786859" cy="646331"/>
+          </a:xfrm>
+          <a:prstGeom prst="rect">
+            <a:avLst/>
+          </a:prstGeom>
+          <a:noFill/>
+        </p:spPr>
+        <p:txBody>
+          <a:bodyPr wrap="square">
+            <a:spAutoFit/>
+          </a:bodyPr>
+          <a:lstStyle/>
+          <a:p>
+            <a:pPr algn="ctr"/>
+            <a:r>
+              <a:rPr lang="es-MX" b="1" i="0" dirty="0">
+                <a:effectLst/>
+                <a:latin typeface="Imprint MT Shadow" panose="04020605060303030202" pitchFamily="82" charset="0"/>
+              </a:rPr>
+              <a:t>Titulo: </a:t>
+            </a:r>
+            <a:r>
+              <a:rPr lang="en-US" b="1" i="0" dirty="0">
+                <a:effectLst/>
+                <a:latin typeface="Imprint MT Shadow" panose="04020605060303030202" pitchFamily="82" charset="0"/>
+              </a:rPr>
+              <a:t>ACM Transactions on Database Systems</a:t>
+            </a:r>
+            <a:r>
+              <a:rPr lang="es-MX" b="1" i="0" dirty="0">
+                <a:effectLst/>
+                <a:latin typeface="Imprint MT Shadow" panose="04020605060303030202" pitchFamily="82" charset="0"/>
+              </a:rPr>
+              <a:t> </a:t>
+            </a:r>
+            <a:endParaRPr lang="es-CO" b="1" dirty="0">
+              <a:latin typeface="Imprint MT Shadow" panose="04020605060303030202" pitchFamily="82" charset="0"/>
+            </a:endParaRPr>
+          </a:p>
+        </p:txBody>
+      </p:sp>
+      <p:sp>
+        <p:nvSpPr>
+          <p:cNvPr id="47" name="CuadroTexto 46">
+            <a:extLst>
+              <a:ext uri="{FF2B5EF4-FFF2-40B4-BE49-F238E27FC236}">
+                <a16:creationId xmlns:a16="http://schemas.microsoft.com/office/drawing/2014/main" id="{7F7AE6D4-BF2C-4D6B-A3A4-07B373895627}"/>
+              </a:ext>
+            </a:extLst>
+          </p:cNvPr>
+          <p:cNvSpPr txBox="1"/>
+          <p:nvPr/>
+        </p:nvSpPr>
+        <p:spPr>
+          <a:xfrm>
+            <a:off x="5513557" y="379491"/>
+            <a:ext cx="1438572" cy="1015663"/>
+          </a:xfrm>
+          <a:prstGeom prst="rect">
+            <a:avLst/>
+          </a:prstGeom>
+          <a:noFill/>
+        </p:spPr>
+        <p:txBody>
+          <a:bodyPr wrap="square" rtlCol="0">
+            <a:spAutoFit/>
+          </a:bodyPr>
+          <a:lstStyle/>
+          <a:p>
+            <a:pPr algn="ctr"/>
+            <a:r>
+              <a:rPr lang="es-CO" sz="6000" b="1" dirty="0">
+                <a:solidFill>
+                  <a:srgbClr val="FFFF00"/>
+                </a:solidFill>
+                <a:latin typeface="Cooper Black" panose="0208090404030B020404" pitchFamily="18" charset="0"/>
+              </a:rPr>
+              <a:t>Q2</a:t>
+            </a:r>
+          </a:p>
+        </p:txBody>
+      </p:sp>
+      <p:sp>
+        <p:nvSpPr>
+          <p:cNvPr id="48" name="CuadroTexto 47">
+            <a:extLst>
+              <a:ext uri="{FF2B5EF4-FFF2-40B4-BE49-F238E27FC236}">
+                <a16:creationId xmlns:a16="http://schemas.microsoft.com/office/drawing/2014/main" id="{81A58E24-5C80-48F2-81EE-B2460C9B0C03}"/>
+              </a:ext>
+            </a:extLst>
+          </p:cNvPr>
+          <p:cNvSpPr txBox="1"/>
+          <p:nvPr/>
+        </p:nvSpPr>
+        <p:spPr>
+          <a:xfrm>
+            <a:off x="5184002" y="2911906"/>
+            <a:ext cx="1815323" cy="369332"/>
+          </a:xfrm>
+          <a:prstGeom prst="rect">
+            <a:avLst/>
+          </a:prstGeom>
+          <a:noFill/>
+        </p:spPr>
+        <p:txBody>
+          <a:bodyPr wrap="square">
+            <a:spAutoFit/>
+          </a:bodyPr>
+          <a:lstStyle/>
+          <a:p>
+            <a:pPr algn="ctr"/>
+            <a:r>
+              <a:rPr lang="es-MX" b="1" i="0" dirty="0">
+                <a:effectLst/>
+                <a:latin typeface="Imprint MT Shadow" panose="04020605060303030202" pitchFamily="82" charset="0"/>
+              </a:rPr>
+              <a:t>Categoría: Q2</a:t>
+            </a:r>
+            <a:endParaRPr lang="es-CO" b="1" dirty="0">
+              <a:latin typeface="Imprint MT Shadow" panose="04020605060303030202" pitchFamily="82" charset="0"/>
+            </a:endParaRPr>
+          </a:p>
+        </p:txBody>
+      </p:sp>
+      <p:sp>
+        <p:nvSpPr>
+          <p:cNvPr id="7" name="CuadroTexto 6">
+            <a:extLst>
+              <a:ext uri="{FF2B5EF4-FFF2-40B4-BE49-F238E27FC236}">
+                <a16:creationId xmlns:a16="http://schemas.microsoft.com/office/drawing/2014/main" id="{A985E777-DDCE-4DD2-8278-DEBB2A071293}"/>
+              </a:ext>
+            </a:extLst>
+          </p:cNvPr>
+          <p:cNvSpPr txBox="1"/>
+          <p:nvPr/>
+        </p:nvSpPr>
+        <p:spPr>
+          <a:xfrm>
+            <a:off x="5184001" y="3828201"/>
+            <a:ext cx="2669081" cy="369332"/>
+          </a:xfrm>
+          <a:prstGeom prst="rect">
+            <a:avLst/>
+          </a:prstGeom>
+          <a:noFill/>
+        </p:spPr>
+        <p:txBody>
+          <a:bodyPr wrap="square">
+            <a:spAutoFit/>
+          </a:bodyPr>
+          <a:lstStyle/>
+          <a:p>
+            <a:pPr algn="ctr"/>
+            <a:r>
+              <a:rPr lang="es-MX" b="1" i="0" dirty="0">
+                <a:effectLst/>
+                <a:latin typeface="Imprint MT Shadow" panose="04020605060303030202" pitchFamily="82" charset="0"/>
+              </a:rPr>
+              <a:t>Contexto: Intern</a:t>
+            </a:r>
+            <a:r>
+              <a:rPr lang="es-MX" b="1" dirty="0">
+                <a:latin typeface="Imprint MT Shadow" panose="04020605060303030202" pitchFamily="82" charset="0"/>
+              </a:rPr>
+              <a:t>acional</a:t>
+            </a:r>
+            <a:endParaRPr lang="es-CO" b="1" dirty="0">
+              <a:latin typeface="Imprint MT Shadow" panose="04020605060303030202" pitchFamily="82" charset="0"/>
+            </a:endParaRPr>
+          </a:p>
+        </p:txBody>
+      </p:sp>
+      <p:sp>
+        <p:nvSpPr>
+          <p:cNvPr id="8" name="CuadroTexto 7">
+            <a:extLst>
+              <a:ext uri="{FF2B5EF4-FFF2-40B4-BE49-F238E27FC236}">
+                <a16:creationId xmlns:a16="http://schemas.microsoft.com/office/drawing/2014/main" id="{A1D628A2-2118-4DF9-A7AD-4C9F218C6D22}"/>
+              </a:ext>
+            </a:extLst>
+          </p:cNvPr>
+          <p:cNvSpPr txBox="1"/>
+          <p:nvPr/>
+        </p:nvSpPr>
+        <p:spPr>
+          <a:xfrm>
+            <a:off x="2985247" y="4744496"/>
+            <a:ext cx="6158460" cy="369332"/>
+          </a:xfrm>
+          <a:prstGeom prst="rect">
+            <a:avLst/>
+          </a:prstGeom>
+          <a:noFill/>
+        </p:spPr>
+        <p:txBody>
+          <a:bodyPr wrap="square">
+            <a:spAutoFit/>
+          </a:bodyPr>
+          <a:lstStyle/>
+          <a:p>
+            <a:pPr algn="ctr"/>
+            <a:r>
+              <a:rPr lang="es-MX" b="1" dirty="0">
+                <a:latin typeface="Imprint MT Shadow" panose="04020605060303030202" pitchFamily="82" charset="0"/>
+              </a:rPr>
+              <a:t>Publicado por: Christopher Matthew </a:t>
+            </a:r>
+            <a:r>
+              <a:rPr lang="es-MX" b="1" dirty="0" err="1">
+                <a:latin typeface="Imprint MT Shadow" panose="04020605060303030202" pitchFamily="82" charset="0"/>
+              </a:rPr>
+              <a:t>Jermaine</a:t>
+            </a:r>
+            <a:endParaRPr lang="es-CO" b="1" dirty="0">
+              <a:latin typeface="Imprint MT Shadow" panose="04020605060303030202" pitchFamily="82" charset="0"/>
+            </a:endParaRPr>
+          </a:p>
+        </p:txBody>
+      </p:sp>
+    </p:spTree>
+    <p:extLst>
+      <p:ext uri="{BB962C8B-B14F-4D97-AF65-F5344CB8AC3E}">
+        <p14:creationId xmlns:p14="http://schemas.microsoft.com/office/powerpoint/2010/main" val="3016351829"/>
+      </p:ext>
+    </p:extLst>
+  </p:cSld>
+  <p:clrMapOvr>
+    <a:masterClrMapping/>
+  </p:clrMapOvr>
+</p:sld>
+</file>
+
+<file path=ppt/slides/slide24.xml><?xml version="1.0" encoding="utf-8"?>
+<p:sld xmlns:a="http://schemas.openxmlformats.org/drawingml/2006/main" xmlns:r="http://schemas.openxmlformats.org/officeDocument/2006/relationships" xmlns:p="http://schemas.openxmlformats.org/presentationml/2006/main">
+  <p:cSld>
+    <p:spTree>
+      <p:nvGrpSpPr>
+        <p:cNvPr id="1" name=""/>
+        <p:cNvGrpSpPr/>
+        <p:nvPr/>
+      </p:nvGrpSpPr>
+      <p:grpSpPr>
+        <a:xfrm>
+          <a:off x="0" y="0"/>
+          <a:ext cx="0" cy="0"/>
+          <a:chOff x="0" y="0"/>
+          <a:chExt cx="0" cy="0"/>
+        </a:xfrm>
+      </p:grpSpPr>
+      <p:pic>
+        <p:nvPicPr>
+          <p:cNvPr id="1026" name="Picture 2" descr="Fondo rojo con textura vintage continental, rojo, retro, continental png |  PNGWing">
+            <a:extLst>
+              <a:ext uri="{FF2B5EF4-FFF2-40B4-BE49-F238E27FC236}">
+                <a16:creationId xmlns:a16="http://schemas.microsoft.com/office/drawing/2014/main" id="{65048E78-8E01-4EC2-8FA0-C0F9A4B8A93A}"/>
+              </a:ext>
+            </a:extLst>
+          </p:cNvPr>
+          <p:cNvPicPr>
+            <a:picLocks noChangeAspect="1" noChangeArrowheads="1"/>
+          </p:cNvPicPr>
+          <p:nvPr/>
+        </p:nvPicPr>
+        <p:blipFill>
+          <a:blip r:embed="rId2">
+            <a:extLst>
+              <a:ext uri="{28A0092B-C50C-407E-A947-70E740481C1C}">
+                <a14:useLocalDpi xmlns:a14="http://schemas.microsoft.com/office/drawing/2010/main" val="0"/>
+              </a:ext>
+            </a:extLst>
+          </a:blip>
+          <a:srcRect/>
+          <a:stretch>
+            <a:fillRect/>
+          </a:stretch>
+        </p:blipFill>
+        <p:spPr bwMode="auto">
+          <a:xfrm>
+            <a:off x="0" y="0"/>
+            <a:ext cx="12192000" cy="6696635"/>
+          </a:xfrm>
+          <a:prstGeom prst="rect">
+            <a:avLst/>
+          </a:prstGeom>
+          <a:noFill/>
+          <a:extLst>
+            <a:ext uri="{909E8E84-426E-40DD-AFC4-6F175D3DCCD1}">
+              <a14:hiddenFill xmlns:a14="http://schemas.microsoft.com/office/drawing/2010/main">
+                <a:solidFill>
+                  <a:srgbClr val="FFFFFF"/>
+                </a:solidFill>
+              </a14:hiddenFill>
+            </a:ext>
+          </a:extLst>
+        </p:spPr>
+      </p:pic>
+      <p:pic>
+        <p:nvPicPr>
+          <p:cNvPr id="3" name="Picture 4" descr="tablero de madera en estilo de dibujos animados 8853564 PNG">
+            <a:extLst>
+              <a:ext uri="{FF2B5EF4-FFF2-40B4-BE49-F238E27FC236}">
+                <a16:creationId xmlns:a16="http://schemas.microsoft.com/office/drawing/2014/main" id="{EFC82DF3-927C-4A51-8E8B-E1DA5E532552}"/>
+              </a:ext>
+            </a:extLst>
+          </p:cNvPr>
+          <p:cNvPicPr>
+            <a:picLocks noChangeAspect="1" noChangeArrowheads="1"/>
+          </p:cNvPicPr>
+          <p:nvPr/>
+        </p:nvPicPr>
+        <p:blipFill>
+          <a:blip r:embed="rId3">
+            <a:extLst>
+              <a:ext uri="{28A0092B-C50C-407E-A947-70E740481C1C}">
+                <a14:useLocalDpi xmlns:a14="http://schemas.microsoft.com/office/drawing/2010/main" val="0"/>
+              </a:ext>
+            </a:extLst>
+          </a:blip>
+          <a:srcRect/>
+          <a:stretch>
+            <a:fillRect/>
+          </a:stretch>
+        </p:blipFill>
+        <p:spPr bwMode="auto">
+          <a:xfrm>
+            <a:off x="2133887" y="1790401"/>
+            <a:ext cx="7924222" cy="3912585"/>
+          </a:xfrm>
+          <a:prstGeom prst="rect">
+            <a:avLst/>
+          </a:prstGeom>
+          <a:noFill/>
+          <a:extLst>
+            <a:ext uri="{909E8E84-426E-40DD-AFC4-6F175D3DCCD1}">
+              <a14:hiddenFill xmlns:a14="http://schemas.microsoft.com/office/drawing/2010/main">
+                <a:solidFill>
+                  <a:srgbClr val="FFFFFF"/>
+                </a:solidFill>
+              </a14:hiddenFill>
+            </a:ext>
+          </a:extLst>
+        </p:spPr>
+      </p:pic>
+      <p:sp>
+        <p:nvSpPr>
+          <p:cNvPr id="46" name="CuadroTexto 45">
+            <a:extLst>
+              <a:ext uri="{FF2B5EF4-FFF2-40B4-BE49-F238E27FC236}">
+                <a16:creationId xmlns:a16="http://schemas.microsoft.com/office/drawing/2014/main" id="{738A3F34-A4B1-4DDC-BBE8-4F245C52246D}"/>
+              </a:ext>
+            </a:extLst>
+          </p:cNvPr>
+          <p:cNvSpPr txBox="1"/>
+          <p:nvPr/>
+        </p:nvSpPr>
+        <p:spPr>
+          <a:xfrm>
+            <a:off x="3698235" y="1953417"/>
+            <a:ext cx="4786859" cy="646331"/>
+          </a:xfrm>
+          <a:prstGeom prst="rect">
+            <a:avLst/>
+          </a:prstGeom>
+          <a:noFill/>
+        </p:spPr>
+        <p:txBody>
+          <a:bodyPr wrap="square">
+            <a:spAutoFit/>
+          </a:bodyPr>
+          <a:lstStyle/>
+          <a:p>
+            <a:pPr algn="ctr"/>
+            <a:r>
+              <a:rPr lang="es-MX" b="1" i="0" dirty="0">
+                <a:effectLst/>
+                <a:latin typeface="Imprint MT Shadow" panose="04020605060303030202" pitchFamily="82" charset="0"/>
+              </a:rPr>
+              <a:t>Titulo: </a:t>
+            </a:r>
+            <a:r>
+              <a:rPr lang="en-US" b="1" i="0" dirty="0">
+                <a:effectLst/>
+                <a:latin typeface="Imprint MT Shadow" panose="04020605060303030202" pitchFamily="82" charset="0"/>
+              </a:rPr>
+              <a:t>ACM Transactions on Modeling and Computer Simulation</a:t>
+            </a:r>
+            <a:endParaRPr lang="es-CO" b="1" dirty="0">
+              <a:latin typeface="Imprint MT Shadow" panose="04020605060303030202" pitchFamily="82" charset="0"/>
+            </a:endParaRPr>
+          </a:p>
+        </p:txBody>
+      </p:sp>
+      <p:sp>
+        <p:nvSpPr>
+          <p:cNvPr id="47" name="CuadroTexto 46">
+            <a:extLst>
+              <a:ext uri="{FF2B5EF4-FFF2-40B4-BE49-F238E27FC236}">
+                <a16:creationId xmlns:a16="http://schemas.microsoft.com/office/drawing/2014/main" id="{7F7AE6D4-BF2C-4D6B-A3A4-07B373895627}"/>
+              </a:ext>
+            </a:extLst>
+          </p:cNvPr>
+          <p:cNvSpPr txBox="1"/>
+          <p:nvPr/>
+        </p:nvSpPr>
+        <p:spPr>
+          <a:xfrm>
+            <a:off x="5513557" y="379491"/>
+            <a:ext cx="1438572" cy="1015663"/>
+          </a:xfrm>
+          <a:prstGeom prst="rect">
+            <a:avLst/>
+          </a:prstGeom>
+          <a:noFill/>
+        </p:spPr>
+        <p:txBody>
+          <a:bodyPr wrap="square" rtlCol="0">
+            <a:spAutoFit/>
+          </a:bodyPr>
+          <a:lstStyle/>
+          <a:p>
+            <a:pPr algn="ctr"/>
+            <a:r>
+              <a:rPr lang="es-CO" sz="6000" b="1" dirty="0">
+                <a:solidFill>
+                  <a:srgbClr val="FFFF00"/>
+                </a:solidFill>
+                <a:latin typeface="Cooper Black" panose="0208090404030B020404" pitchFamily="18" charset="0"/>
+              </a:rPr>
+              <a:t>Q3</a:t>
+            </a:r>
+          </a:p>
+        </p:txBody>
+      </p:sp>
+      <p:sp>
+        <p:nvSpPr>
+          <p:cNvPr id="48" name="CuadroTexto 47">
+            <a:extLst>
+              <a:ext uri="{FF2B5EF4-FFF2-40B4-BE49-F238E27FC236}">
+                <a16:creationId xmlns:a16="http://schemas.microsoft.com/office/drawing/2014/main" id="{81A58E24-5C80-48F2-81EE-B2460C9B0C03}"/>
+              </a:ext>
+            </a:extLst>
+          </p:cNvPr>
+          <p:cNvSpPr txBox="1"/>
+          <p:nvPr/>
+        </p:nvSpPr>
+        <p:spPr>
+          <a:xfrm>
+            <a:off x="5184002" y="2911906"/>
+            <a:ext cx="1815323" cy="369332"/>
+          </a:xfrm>
+          <a:prstGeom prst="rect">
+            <a:avLst/>
+          </a:prstGeom>
+          <a:noFill/>
+        </p:spPr>
+        <p:txBody>
+          <a:bodyPr wrap="square">
+            <a:spAutoFit/>
+          </a:bodyPr>
+          <a:lstStyle/>
+          <a:p>
+            <a:pPr algn="ctr"/>
+            <a:r>
+              <a:rPr lang="es-MX" b="1" i="0" dirty="0">
+                <a:effectLst/>
+                <a:latin typeface="Imprint MT Shadow" panose="04020605060303030202" pitchFamily="82" charset="0"/>
+              </a:rPr>
+              <a:t>Categoría: Q3</a:t>
+            </a:r>
+            <a:endParaRPr lang="es-CO" b="1" dirty="0">
+              <a:latin typeface="Imprint MT Shadow" panose="04020605060303030202" pitchFamily="82" charset="0"/>
+            </a:endParaRPr>
+          </a:p>
+        </p:txBody>
+      </p:sp>
+      <p:sp>
+        <p:nvSpPr>
+          <p:cNvPr id="7" name="CuadroTexto 6">
+            <a:extLst>
+              <a:ext uri="{FF2B5EF4-FFF2-40B4-BE49-F238E27FC236}">
+                <a16:creationId xmlns:a16="http://schemas.microsoft.com/office/drawing/2014/main" id="{A985E777-DDCE-4DD2-8278-DEBB2A071293}"/>
+              </a:ext>
+            </a:extLst>
+          </p:cNvPr>
+          <p:cNvSpPr txBox="1"/>
+          <p:nvPr/>
+        </p:nvSpPr>
+        <p:spPr>
+          <a:xfrm>
+            <a:off x="5184001" y="3828201"/>
+            <a:ext cx="2669081" cy="369332"/>
+          </a:xfrm>
+          <a:prstGeom prst="rect">
+            <a:avLst/>
+          </a:prstGeom>
+          <a:noFill/>
+        </p:spPr>
+        <p:txBody>
+          <a:bodyPr wrap="square">
+            <a:spAutoFit/>
+          </a:bodyPr>
+          <a:lstStyle/>
+          <a:p>
+            <a:pPr algn="ctr"/>
+            <a:r>
+              <a:rPr lang="es-MX" b="1" i="0" dirty="0">
+                <a:effectLst/>
+                <a:latin typeface="Imprint MT Shadow" panose="04020605060303030202" pitchFamily="82" charset="0"/>
+              </a:rPr>
+              <a:t>Contexto: Intern</a:t>
+            </a:r>
+            <a:r>
+              <a:rPr lang="es-MX" b="1" dirty="0">
+                <a:latin typeface="Imprint MT Shadow" panose="04020605060303030202" pitchFamily="82" charset="0"/>
+              </a:rPr>
+              <a:t>acional</a:t>
+            </a:r>
+            <a:endParaRPr lang="es-CO" b="1" dirty="0">
+              <a:latin typeface="Imprint MT Shadow" panose="04020605060303030202" pitchFamily="82" charset="0"/>
+            </a:endParaRPr>
+          </a:p>
+        </p:txBody>
+      </p:sp>
+      <p:sp>
+        <p:nvSpPr>
+          <p:cNvPr id="8" name="CuadroTexto 7">
+            <a:extLst>
+              <a:ext uri="{FF2B5EF4-FFF2-40B4-BE49-F238E27FC236}">
+                <a16:creationId xmlns:a16="http://schemas.microsoft.com/office/drawing/2014/main" id="{A1D628A2-2118-4DF9-A7AD-4C9F218C6D22}"/>
+              </a:ext>
+            </a:extLst>
+          </p:cNvPr>
+          <p:cNvSpPr txBox="1"/>
+          <p:nvPr/>
+        </p:nvSpPr>
+        <p:spPr>
+          <a:xfrm>
+            <a:off x="2985247" y="4744496"/>
+            <a:ext cx="6158460" cy="646331"/>
+          </a:xfrm>
+          <a:prstGeom prst="rect">
+            <a:avLst/>
+          </a:prstGeom>
+          <a:noFill/>
+        </p:spPr>
+        <p:txBody>
+          <a:bodyPr wrap="square">
+            <a:spAutoFit/>
+          </a:bodyPr>
+          <a:lstStyle/>
+          <a:p>
+            <a:pPr algn="ctr"/>
+            <a:r>
+              <a:rPr lang="es-MX" b="1" dirty="0">
+                <a:latin typeface="Imprint MT Shadow" panose="04020605060303030202" pitchFamily="82" charset="0"/>
+              </a:rPr>
+              <a:t>Publicado por: </a:t>
+            </a:r>
+            <a:r>
+              <a:rPr lang="en-US" b="1" dirty="0">
+                <a:latin typeface="Imprint MT Shadow" panose="04020605060303030202" pitchFamily="82" charset="0"/>
+              </a:rPr>
+              <a:t>Association for Computing </a:t>
+            </a:r>
+            <a:r>
+              <a:rPr lang="en-US" b="1" dirty="0" err="1">
+                <a:latin typeface="Imprint MT Shadow" panose="04020605060303030202" pitchFamily="82" charset="0"/>
+              </a:rPr>
+              <a:t>MachineryNew</a:t>
+            </a:r>
+            <a:r>
+              <a:rPr lang="en-US" b="1" dirty="0">
+                <a:latin typeface="Imprint MT Shadow" panose="04020605060303030202" pitchFamily="82" charset="0"/>
+              </a:rPr>
+              <a:t> </a:t>
+            </a:r>
+            <a:r>
+              <a:rPr lang="en-US" b="1" dirty="0" err="1">
+                <a:latin typeface="Imprint MT Shadow" panose="04020605060303030202" pitchFamily="82" charset="0"/>
+              </a:rPr>
+              <a:t>YorkNYUnited</a:t>
+            </a:r>
+            <a:r>
+              <a:rPr lang="en-US" b="1" dirty="0">
+                <a:latin typeface="Imprint MT Shadow" panose="04020605060303030202" pitchFamily="82" charset="0"/>
+              </a:rPr>
+              <a:t> States</a:t>
+            </a:r>
+            <a:endParaRPr lang="es-CO" b="1" dirty="0">
+              <a:latin typeface="Imprint MT Shadow" panose="04020605060303030202" pitchFamily="82" charset="0"/>
+            </a:endParaRPr>
+          </a:p>
+        </p:txBody>
+      </p:sp>
+    </p:spTree>
+    <p:extLst>
+      <p:ext uri="{BB962C8B-B14F-4D97-AF65-F5344CB8AC3E}">
+        <p14:creationId xmlns:p14="http://schemas.microsoft.com/office/powerpoint/2010/main" val="3483863732"/>
+      </p:ext>
+    </p:extLst>
+  </p:cSld>
+  <p:clrMapOvr>
+    <a:masterClrMapping/>
+  </p:clrMapOvr>
+</p:sld>
+</file>
+
+<file path=ppt/slides/slide25.xml><?xml version="1.0" encoding="utf-8"?>
+<p:sld xmlns:a="http://schemas.openxmlformats.org/drawingml/2006/main" xmlns:r="http://schemas.openxmlformats.org/officeDocument/2006/relationships" xmlns:p="http://schemas.openxmlformats.org/presentationml/2006/main">
+  <p:cSld>
+    <p:spTree>
+      <p:nvGrpSpPr>
+        <p:cNvPr id="1" name=""/>
+        <p:cNvGrpSpPr/>
+        <p:nvPr/>
+      </p:nvGrpSpPr>
+      <p:grpSpPr>
+        <a:xfrm>
+          <a:off x="0" y="0"/>
+          <a:ext cx="0" cy="0"/>
+          <a:chOff x="0" y="0"/>
+          <a:chExt cx="0" cy="0"/>
+        </a:xfrm>
+      </p:grpSpPr>
+      <p:pic>
+        <p:nvPicPr>
+          <p:cNvPr id="1026" name="Picture 2" descr="Fondo rojo con textura vintage continental, rojo, retro, continental png |  PNGWing">
+            <a:extLst>
+              <a:ext uri="{FF2B5EF4-FFF2-40B4-BE49-F238E27FC236}">
+                <a16:creationId xmlns:a16="http://schemas.microsoft.com/office/drawing/2014/main" id="{65048E78-8E01-4EC2-8FA0-C0F9A4B8A93A}"/>
+              </a:ext>
+            </a:extLst>
+          </p:cNvPr>
+          <p:cNvPicPr>
+            <a:picLocks noChangeAspect="1" noChangeArrowheads="1"/>
+          </p:cNvPicPr>
+          <p:nvPr/>
+        </p:nvPicPr>
+        <p:blipFill>
+          <a:blip r:embed="rId2">
+            <a:extLst>
+              <a:ext uri="{28A0092B-C50C-407E-A947-70E740481C1C}">
+                <a14:useLocalDpi xmlns:a14="http://schemas.microsoft.com/office/drawing/2010/main" val="0"/>
+              </a:ext>
+            </a:extLst>
+          </a:blip>
+          <a:srcRect/>
+          <a:stretch>
+            <a:fillRect/>
+          </a:stretch>
+        </p:blipFill>
+        <p:spPr bwMode="auto">
+          <a:xfrm>
+            <a:off x="0" y="0"/>
+            <a:ext cx="12192000" cy="6696635"/>
+          </a:xfrm>
+          <a:prstGeom prst="rect">
+            <a:avLst/>
+          </a:prstGeom>
+          <a:noFill/>
+          <a:extLst>
+            <a:ext uri="{909E8E84-426E-40DD-AFC4-6F175D3DCCD1}">
+              <a14:hiddenFill xmlns:a14="http://schemas.microsoft.com/office/drawing/2010/main">
+                <a:solidFill>
+                  <a:srgbClr val="FFFFFF"/>
+                </a:solidFill>
+              </a14:hiddenFill>
+            </a:ext>
+          </a:extLst>
+        </p:spPr>
+      </p:pic>
+      <p:pic>
+        <p:nvPicPr>
+          <p:cNvPr id="3" name="Picture 4" descr="tablero de madera en estilo de dibujos animados 8853564 PNG">
+            <a:extLst>
+              <a:ext uri="{FF2B5EF4-FFF2-40B4-BE49-F238E27FC236}">
+                <a16:creationId xmlns:a16="http://schemas.microsoft.com/office/drawing/2014/main" id="{EFC82DF3-927C-4A51-8E8B-E1DA5E532552}"/>
+              </a:ext>
+            </a:extLst>
+          </p:cNvPr>
+          <p:cNvPicPr>
+            <a:picLocks noChangeAspect="1" noChangeArrowheads="1"/>
+          </p:cNvPicPr>
+          <p:nvPr/>
+        </p:nvPicPr>
+        <p:blipFill>
+          <a:blip r:embed="rId3">
+            <a:extLst>
+              <a:ext uri="{28A0092B-C50C-407E-A947-70E740481C1C}">
+                <a14:useLocalDpi xmlns:a14="http://schemas.microsoft.com/office/drawing/2010/main" val="0"/>
+              </a:ext>
+            </a:extLst>
+          </a:blip>
+          <a:srcRect/>
+          <a:stretch>
+            <a:fillRect/>
+          </a:stretch>
+        </p:blipFill>
+        <p:spPr bwMode="auto">
+          <a:xfrm>
+            <a:off x="2133887" y="1790401"/>
+            <a:ext cx="7924222" cy="3912585"/>
+          </a:xfrm>
+          <a:prstGeom prst="rect">
+            <a:avLst/>
+          </a:prstGeom>
+          <a:noFill/>
+          <a:extLst>
+            <a:ext uri="{909E8E84-426E-40DD-AFC4-6F175D3DCCD1}">
+              <a14:hiddenFill xmlns:a14="http://schemas.microsoft.com/office/drawing/2010/main">
+                <a:solidFill>
+                  <a:srgbClr val="FFFFFF"/>
+                </a:solidFill>
+              </a14:hiddenFill>
+            </a:ext>
+          </a:extLst>
+        </p:spPr>
+      </p:pic>
+      <p:sp>
+        <p:nvSpPr>
+          <p:cNvPr id="46" name="CuadroTexto 45">
+            <a:extLst>
+              <a:ext uri="{FF2B5EF4-FFF2-40B4-BE49-F238E27FC236}">
+                <a16:creationId xmlns:a16="http://schemas.microsoft.com/office/drawing/2014/main" id="{738A3F34-A4B1-4DDC-BBE8-4F245C52246D}"/>
+              </a:ext>
+            </a:extLst>
+          </p:cNvPr>
+          <p:cNvSpPr txBox="1"/>
+          <p:nvPr/>
+        </p:nvSpPr>
+        <p:spPr>
+          <a:xfrm>
+            <a:off x="3698235" y="1953417"/>
+            <a:ext cx="4786859" cy="646331"/>
+          </a:xfrm>
+          <a:prstGeom prst="rect">
+            <a:avLst/>
+          </a:prstGeom>
+          <a:noFill/>
+        </p:spPr>
+        <p:txBody>
+          <a:bodyPr wrap="square">
+            <a:spAutoFit/>
+          </a:bodyPr>
+          <a:lstStyle/>
+          <a:p>
+            <a:pPr algn="ctr"/>
+            <a:r>
+              <a:rPr lang="es-MX" b="1" i="0" dirty="0">
+                <a:effectLst/>
+                <a:latin typeface="Imprint MT Shadow" panose="04020605060303030202" pitchFamily="82" charset="0"/>
+              </a:rPr>
+              <a:t>Titulo: </a:t>
+            </a:r>
+            <a:r>
+              <a:rPr lang="en-US" b="1" i="0" dirty="0">
+                <a:effectLst/>
+                <a:latin typeface="Imprint MT Shadow" panose="04020605060303030202" pitchFamily="82" charset="0"/>
+              </a:rPr>
+              <a:t>ACM Transactions on Reconfigurable Technology and Systems</a:t>
+            </a:r>
+            <a:endParaRPr lang="es-CO" b="1" dirty="0">
+              <a:latin typeface="Imprint MT Shadow" panose="04020605060303030202" pitchFamily="82" charset="0"/>
+            </a:endParaRPr>
+          </a:p>
+        </p:txBody>
+      </p:sp>
+      <p:sp>
+        <p:nvSpPr>
+          <p:cNvPr id="47" name="CuadroTexto 46">
+            <a:extLst>
+              <a:ext uri="{FF2B5EF4-FFF2-40B4-BE49-F238E27FC236}">
+                <a16:creationId xmlns:a16="http://schemas.microsoft.com/office/drawing/2014/main" id="{7F7AE6D4-BF2C-4D6B-A3A4-07B373895627}"/>
+              </a:ext>
+            </a:extLst>
+          </p:cNvPr>
+          <p:cNvSpPr txBox="1"/>
+          <p:nvPr/>
+        </p:nvSpPr>
+        <p:spPr>
+          <a:xfrm>
+            <a:off x="5513557" y="379491"/>
+            <a:ext cx="1438572" cy="1015663"/>
+          </a:xfrm>
+          <a:prstGeom prst="rect">
+            <a:avLst/>
+          </a:prstGeom>
+          <a:noFill/>
+        </p:spPr>
+        <p:txBody>
+          <a:bodyPr wrap="square" rtlCol="0">
+            <a:spAutoFit/>
+          </a:bodyPr>
+          <a:lstStyle/>
+          <a:p>
+            <a:pPr algn="ctr"/>
+            <a:r>
+              <a:rPr lang="es-CO" sz="6000" b="1" dirty="0">
+                <a:solidFill>
+                  <a:srgbClr val="FFFF00"/>
+                </a:solidFill>
+                <a:latin typeface="Cooper Black" panose="0208090404030B020404" pitchFamily="18" charset="0"/>
+              </a:rPr>
+              <a:t>Q3</a:t>
+            </a:r>
+          </a:p>
+        </p:txBody>
+      </p:sp>
+      <p:sp>
+        <p:nvSpPr>
+          <p:cNvPr id="48" name="CuadroTexto 47">
+            <a:extLst>
+              <a:ext uri="{FF2B5EF4-FFF2-40B4-BE49-F238E27FC236}">
+                <a16:creationId xmlns:a16="http://schemas.microsoft.com/office/drawing/2014/main" id="{81A58E24-5C80-48F2-81EE-B2460C9B0C03}"/>
+              </a:ext>
+            </a:extLst>
+          </p:cNvPr>
+          <p:cNvSpPr txBox="1"/>
+          <p:nvPr/>
+        </p:nvSpPr>
+        <p:spPr>
+          <a:xfrm>
+            <a:off x="5184002" y="2911906"/>
+            <a:ext cx="1815323" cy="369332"/>
+          </a:xfrm>
+          <a:prstGeom prst="rect">
+            <a:avLst/>
+          </a:prstGeom>
+          <a:noFill/>
+        </p:spPr>
+        <p:txBody>
+          <a:bodyPr wrap="square">
+            <a:spAutoFit/>
+          </a:bodyPr>
+          <a:lstStyle/>
+          <a:p>
+            <a:pPr algn="ctr"/>
+            <a:r>
+              <a:rPr lang="es-MX" b="1" i="0" dirty="0">
+                <a:effectLst/>
+                <a:latin typeface="Imprint MT Shadow" panose="04020605060303030202" pitchFamily="82" charset="0"/>
+              </a:rPr>
+              <a:t>Categoría: Q3</a:t>
+            </a:r>
+            <a:endParaRPr lang="es-CO" b="1" dirty="0">
+              <a:latin typeface="Imprint MT Shadow" panose="04020605060303030202" pitchFamily="82" charset="0"/>
+            </a:endParaRPr>
+          </a:p>
+        </p:txBody>
+      </p:sp>
+      <p:sp>
+        <p:nvSpPr>
+          <p:cNvPr id="7" name="CuadroTexto 6">
+            <a:extLst>
+              <a:ext uri="{FF2B5EF4-FFF2-40B4-BE49-F238E27FC236}">
+                <a16:creationId xmlns:a16="http://schemas.microsoft.com/office/drawing/2014/main" id="{A985E777-DDCE-4DD2-8278-DEBB2A071293}"/>
+              </a:ext>
+            </a:extLst>
+          </p:cNvPr>
+          <p:cNvSpPr txBox="1"/>
+          <p:nvPr/>
+        </p:nvSpPr>
+        <p:spPr>
+          <a:xfrm>
+            <a:off x="5184001" y="3828201"/>
+            <a:ext cx="2669081" cy="369332"/>
+          </a:xfrm>
+          <a:prstGeom prst="rect">
+            <a:avLst/>
+          </a:prstGeom>
+          <a:noFill/>
+        </p:spPr>
+        <p:txBody>
+          <a:bodyPr wrap="square">
+            <a:spAutoFit/>
+          </a:bodyPr>
+          <a:lstStyle/>
+          <a:p>
+            <a:pPr algn="ctr"/>
+            <a:r>
+              <a:rPr lang="es-MX" b="1" i="0" dirty="0">
+                <a:effectLst/>
+                <a:latin typeface="Imprint MT Shadow" panose="04020605060303030202" pitchFamily="82" charset="0"/>
+              </a:rPr>
+              <a:t>Contexto: Intern</a:t>
+            </a:r>
+            <a:r>
+              <a:rPr lang="es-MX" b="1" dirty="0">
+                <a:latin typeface="Imprint MT Shadow" panose="04020605060303030202" pitchFamily="82" charset="0"/>
+              </a:rPr>
+              <a:t>acional</a:t>
+            </a:r>
+            <a:endParaRPr lang="es-CO" b="1" dirty="0">
+              <a:latin typeface="Imprint MT Shadow" panose="04020605060303030202" pitchFamily="82" charset="0"/>
+            </a:endParaRPr>
+          </a:p>
+        </p:txBody>
+      </p:sp>
+      <p:sp>
+        <p:nvSpPr>
+          <p:cNvPr id="8" name="CuadroTexto 7">
+            <a:extLst>
+              <a:ext uri="{FF2B5EF4-FFF2-40B4-BE49-F238E27FC236}">
+                <a16:creationId xmlns:a16="http://schemas.microsoft.com/office/drawing/2014/main" id="{A1D628A2-2118-4DF9-A7AD-4C9F218C6D22}"/>
+              </a:ext>
+            </a:extLst>
+          </p:cNvPr>
+          <p:cNvSpPr txBox="1"/>
+          <p:nvPr/>
+        </p:nvSpPr>
+        <p:spPr>
+          <a:xfrm>
+            <a:off x="2985247" y="4744496"/>
+            <a:ext cx="6158460" cy="646331"/>
+          </a:xfrm>
+          <a:prstGeom prst="rect">
+            <a:avLst/>
+          </a:prstGeom>
+          <a:noFill/>
+        </p:spPr>
+        <p:txBody>
+          <a:bodyPr wrap="square">
+            <a:spAutoFit/>
+          </a:bodyPr>
+          <a:lstStyle/>
+          <a:p>
+            <a:pPr algn="ctr"/>
+            <a:r>
+              <a:rPr lang="es-MX" b="1" dirty="0">
+                <a:latin typeface="Imprint MT Shadow" panose="04020605060303030202" pitchFamily="82" charset="0"/>
+              </a:rPr>
+              <a:t>Publicado por: </a:t>
+            </a:r>
+            <a:r>
+              <a:rPr lang="en-US" b="1" dirty="0">
+                <a:latin typeface="Imprint MT Shadow" panose="04020605060303030202" pitchFamily="82" charset="0"/>
+              </a:rPr>
+              <a:t>Association for Computing Machinery New York NY United States</a:t>
+            </a:r>
+            <a:endParaRPr lang="es-CO" b="1" dirty="0">
+              <a:latin typeface="Imprint MT Shadow" panose="04020605060303030202" pitchFamily="82" charset="0"/>
+            </a:endParaRPr>
+          </a:p>
+        </p:txBody>
+      </p:sp>
+    </p:spTree>
+    <p:extLst>
+      <p:ext uri="{BB962C8B-B14F-4D97-AF65-F5344CB8AC3E}">
+        <p14:creationId xmlns:p14="http://schemas.microsoft.com/office/powerpoint/2010/main" val="1597518145"/>
+      </p:ext>
+    </p:extLst>
+  </p:cSld>
+  <p:clrMapOvr>
+    <a:masterClrMapping/>
+  </p:clrMapOvr>
+</p:sld>
+</file>
+
+<file path=ppt/slides/slide26.xml><?xml version="1.0" encoding="utf-8"?>
+<p:sld xmlns:a="http://schemas.openxmlformats.org/drawingml/2006/main" xmlns:r="http://schemas.openxmlformats.org/officeDocument/2006/relationships" xmlns:p="http://schemas.openxmlformats.org/presentationml/2006/main">
+  <p:cSld>
+    <p:spTree>
+      <p:nvGrpSpPr>
+        <p:cNvPr id="1" name=""/>
+        <p:cNvGrpSpPr/>
+        <p:nvPr/>
+      </p:nvGrpSpPr>
+      <p:grpSpPr>
+        <a:xfrm>
+          <a:off x="0" y="0"/>
+          <a:ext cx="0" cy="0"/>
+          <a:chOff x="0" y="0"/>
+          <a:chExt cx="0" cy="0"/>
+        </a:xfrm>
+      </p:grpSpPr>
+      <p:pic>
+        <p:nvPicPr>
+          <p:cNvPr id="1026" name="Picture 2" descr="Fondo rojo con textura vintage continental, rojo, retro, continental png |  PNGWing">
+            <a:extLst>
+              <a:ext uri="{FF2B5EF4-FFF2-40B4-BE49-F238E27FC236}">
+                <a16:creationId xmlns:a16="http://schemas.microsoft.com/office/drawing/2014/main" id="{65048E78-8E01-4EC2-8FA0-C0F9A4B8A93A}"/>
+              </a:ext>
+            </a:extLst>
+          </p:cNvPr>
+          <p:cNvPicPr>
+            <a:picLocks noChangeAspect="1" noChangeArrowheads="1"/>
+          </p:cNvPicPr>
+          <p:nvPr/>
+        </p:nvPicPr>
+        <p:blipFill>
+          <a:blip r:embed="rId2">
+            <a:extLst>
+              <a:ext uri="{28A0092B-C50C-407E-A947-70E740481C1C}">
+                <a14:useLocalDpi xmlns:a14="http://schemas.microsoft.com/office/drawing/2010/main" val="0"/>
+              </a:ext>
+            </a:extLst>
+          </a:blip>
+          <a:srcRect/>
+          <a:stretch>
+            <a:fillRect/>
+          </a:stretch>
+        </p:blipFill>
+        <p:spPr bwMode="auto">
+          <a:xfrm>
+            <a:off x="0" y="0"/>
+            <a:ext cx="12192000" cy="6696635"/>
+          </a:xfrm>
+          <a:prstGeom prst="rect">
+            <a:avLst/>
+          </a:prstGeom>
+          <a:noFill/>
+          <a:extLst>
+            <a:ext uri="{909E8E84-426E-40DD-AFC4-6F175D3DCCD1}">
+              <a14:hiddenFill xmlns:a14="http://schemas.microsoft.com/office/drawing/2010/main">
+                <a:solidFill>
+                  <a:srgbClr val="FFFFFF"/>
+                </a:solidFill>
+              </a14:hiddenFill>
+            </a:ext>
+          </a:extLst>
+        </p:spPr>
+      </p:pic>
+      <p:pic>
+        <p:nvPicPr>
+          <p:cNvPr id="3" name="Picture 4" descr="tablero de madera en estilo de dibujos animados 8853564 PNG">
+            <a:extLst>
+              <a:ext uri="{FF2B5EF4-FFF2-40B4-BE49-F238E27FC236}">
+                <a16:creationId xmlns:a16="http://schemas.microsoft.com/office/drawing/2014/main" id="{EFC82DF3-927C-4A51-8E8B-E1DA5E532552}"/>
+              </a:ext>
+            </a:extLst>
+          </p:cNvPr>
+          <p:cNvPicPr>
+            <a:picLocks noChangeAspect="1" noChangeArrowheads="1"/>
+          </p:cNvPicPr>
+          <p:nvPr/>
+        </p:nvPicPr>
+        <p:blipFill>
+          <a:blip r:embed="rId3">
+            <a:extLst>
+              <a:ext uri="{28A0092B-C50C-407E-A947-70E740481C1C}">
+                <a14:useLocalDpi xmlns:a14="http://schemas.microsoft.com/office/drawing/2010/main" val="0"/>
+              </a:ext>
+            </a:extLst>
+          </a:blip>
+          <a:srcRect/>
+          <a:stretch>
+            <a:fillRect/>
+          </a:stretch>
+        </p:blipFill>
+        <p:spPr bwMode="auto">
+          <a:xfrm>
+            <a:off x="2133887" y="1790401"/>
+            <a:ext cx="7924222" cy="3912585"/>
+          </a:xfrm>
+          <a:prstGeom prst="rect">
+            <a:avLst/>
+          </a:prstGeom>
+          <a:noFill/>
+          <a:extLst>
+            <a:ext uri="{909E8E84-426E-40DD-AFC4-6F175D3DCCD1}">
+              <a14:hiddenFill xmlns:a14="http://schemas.microsoft.com/office/drawing/2010/main">
+                <a:solidFill>
+                  <a:srgbClr val="FFFFFF"/>
+                </a:solidFill>
+              </a14:hiddenFill>
+            </a:ext>
+          </a:extLst>
+        </p:spPr>
+      </p:pic>
+      <p:sp>
+        <p:nvSpPr>
+          <p:cNvPr id="46" name="CuadroTexto 45">
+            <a:extLst>
+              <a:ext uri="{FF2B5EF4-FFF2-40B4-BE49-F238E27FC236}">
+                <a16:creationId xmlns:a16="http://schemas.microsoft.com/office/drawing/2014/main" id="{738A3F34-A4B1-4DDC-BBE8-4F245C52246D}"/>
+              </a:ext>
+            </a:extLst>
+          </p:cNvPr>
+          <p:cNvSpPr txBox="1"/>
+          <p:nvPr/>
+        </p:nvSpPr>
+        <p:spPr>
+          <a:xfrm>
+            <a:off x="3698235" y="1953417"/>
+            <a:ext cx="4786859" cy="369332"/>
+          </a:xfrm>
+          <a:prstGeom prst="rect">
+            <a:avLst/>
+          </a:prstGeom>
+          <a:noFill/>
+        </p:spPr>
+        <p:txBody>
+          <a:bodyPr wrap="square">
+            <a:spAutoFit/>
+          </a:bodyPr>
+          <a:lstStyle/>
+          <a:p>
+            <a:pPr algn="ctr"/>
+            <a:r>
+              <a:rPr lang="es-MX" b="1" i="0" dirty="0">
+                <a:effectLst/>
+                <a:latin typeface="Imprint MT Shadow" panose="04020605060303030202" pitchFamily="82" charset="0"/>
+              </a:rPr>
+              <a:t>Titulo: </a:t>
+            </a:r>
+            <a:r>
+              <a:rPr lang="en-US" b="1" i="0" dirty="0">
+                <a:effectLst/>
+                <a:latin typeface="Imprint MT Shadow" panose="04020605060303030202" pitchFamily="82" charset="0"/>
+              </a:rPr>
+              <a:t>Acoustical Physics</a:t>
+            </a:r>
+            <a:endParaRPr lang="es-CO" b="1" dirty="0">
+              <a:latin typeface="Imprint MT Shadow" panose="04020605060303030202" pitchFamily="82" charset="0"/>
+            </a:endParaRPr>
+          </a:p>
+        </p:txBody>
+      </p:sp>
+      <p:sp>
+        <p:nvSpPr>
+          <p:cNvPr id="47" name="CuadroTexto 46">
+            <a:extLst>
+              <a:ext uri="{FF2B5EF4-FFF2-40B4-BE49-F238E27FC236}">
+                <a16:creationId xmlns:a16="http://schemas.microsoft.com/office/drawing/2014/main" id="{7F7AE6D4-BF2C-4D6B-A3A4-07B373895627}"/>
+              </a:ext>
+            </a:extLst>
+          </p:cNvPr>
+          <p:cNvSpPr txBox="1"/>
+          <p:nvPr/>
+        </p:nvSpPr>
+        <p:spPr>
+          <a:xfrm>
+            <a:off x="5513557" y="379491"/>
+            <a:ext cx="1438572" cy="1015663"/>
+          </a:xfrm>
+          <a:prstGeom prst="rect">
+            <a:avLst/>
+          </a:prstGeom>
+          <a:noFill/>
+        </p:spPr>
+        <p:txBody>
+          <a:bodyPr wrap="square" rtlCol="0">
+            <a:spAutoFit/>
+          </a:bodyPr>
+          <a:lstStyle/>
+          <a:p>
+            <a:pPr algn="ctr"/>
+            <a:r>
+              <a:rPr lang="es-CO" sz="6000" b="1" dirty="0">
+                <a:solidFill>
+                  <a:srgbClr val="FFFF00"/>
+                </a:solidFill>
+                <a:latin typeface="Cooper Black" panose="0208090404030B020404" pitchFamily="18" charset="0"/>
+              </a:rPr>
+              <a:t>Q3</a:t>
+            </a:r>
+          </a:p>
+        </p:txBody>
+      </p:sp>
+      <p:sp>
+        <p:nvSpPr>
+          <p:cNvPr id="48" name="CuadroTexto 47">
+            <a:extLst>
+              <a:ext uri="{FF2B5EF4-FFF2-40B4-BE49-F238E27FC236}">
+                <a16:creationId xmlns:a16="http://schemas.microsoft.com/office/drawing/2014/main" id="{81A58E24-5C80-48F2-81EE-B2460C9B0C03}"/>
+              </a:ext>
+            </a:extLst>
+          </p:cNvPr>
+          <p:cNvSpPr txBox="1"/>
+          <p:nvPr/>
+        </p:nvSpPr>
+        <p:spPr>
+          <a:xfrm>
+            <a:off x="5184002" y="2911906"/>
+            <a:ext cx="1815323" cy="369332"/>
+          </a:xfrm>
+          <a:prstGeom prst="rect">
+            <a:avLst/>
+          </a:prstGeom>
+          <a:noFill/>
+        </p:spPr>
+        <p:txBody>
+          <a:bodyPr wrap="square">
+            <a:spAutoFit/>
+          </a:bodyPr>
+          <a:lstStyle/>
+          <a:p>
+            <a:pPr algn="ctr"/>
+            <a:r>
+              <a:rPr lang="es-MX" b="1" i="0" dirty="0">
+                <a:effectLst/>
+                <a:latin typeface="Imprint MT Shadow" panose="04020605060303030202" pitchFamily="82" charset="0"/>
+              </a:rPr>
+              <a:t>Categoría: Q3</a:t>
+            </a:r>
+            <a:endParaRPr lang="es-CO" b="1" dirty="0">
+              <a:latin typeface="Imprint MT Shadow" panose="04020605060303030202" pitchFamily="82" charset="0"/>
+            </a:endParaRPr>
+          </a:p>
+        </p:txBody>
+      </p:sp>
+      <p:sp>
+        <p:nvSpPr>
+          <p:cNvPr id="7" name="CuadroTexto 6">
+            <a:extLst>
+              <a:ext uri="{FF2B5EF4-FFF2-40B4-BE49-F238E27FC236}">
+                <a16:creationId xmlns:a16="http://schemas.microsoft.com/office/drawing/2014/main" id="{A985E777-DDCE-4DD2-8278-DEBB2A071293}"/>
+              </a:ext>
+            </a:extLst>
+          </p:cNvPr>
+          <p:cNvSpPr txBox="1"/>
+          <p:nvPr/>
+        </p:nvSpPr>
+        <p:spPr>
+          <a:xfrm>
+            <a:off x="5184001" y="3828201"/>
+            <a:ext cx="2669081" cy="369332"/>
+          </a:xfrm>
+          <a:prstGeom prst="rect">
+            <a:avLst/>
+          </a:prstGeom>
+          <a:noFill/>
+        </p:spPr>
+        <p:txBody>
+          <a:bodyPr wrap="square">
+            <a:spAutoFit/>
+          </a:bodyPr>
+          <a:lstStyle/>
+          <a:p>
+            <a:pPr algn="ctr"/>
+            <a:r>
+              <a:rPr lang="es-MX" b="1" i="0" dirty="0">
+                <a:effectLst/>
+                <a:latin typeface="Imprint MT Shadow" panose="04020605060303030202" pitchFamily="82" charset="0"/>
+              </a:rPr>
+              <a:t>Contexto: Intern</a:t>
+            </a:r>
+            <a:r>
+              <a:rPr lang="es-MX" b="1" dirty="0">
+                <a:latin typeface="Imprint MT Shadow" panose="04020605060303030202" pitchFamily="82" charset="0"/>
+              </a:rPr>
+              <a:t>acional</a:t>
+            </a:r>
+            <a:endParaRPr lang="es-CO" b="1" dirty="0">
+              <a:latin typeface="Imprint MT Shadow" panose="04020605060303030202" pitchFamily="82" charset="0"/>
+            </a:endParaRPr>
+          </a:p>
+        </p:txBody>
+      </p:sp>
+      <p:sp>
+        <p:nvSpPr>
+          <p:cNvPr id="8" name="CuadroTexto 7">
+            <a:extLst>
+              <a:ext uri="{FF2B5EF4-FFF2-40B4-BE49-F238E27FC236}">
+                <a16:creationId xmlns:a16="http://schemas.microsoft.com/office/drawing/2014/main" id="{A1D628A2-2118-4DF9-A7AD-4C9F218C6D22}"/>
+              </a:ext>
+            </a:extLst>
+          </p:cNvPr>
+          <p:cNvSpPr txBox="1"/>
+          <p:nvPr/>
+        </p:nvSpPr>
+        <p:spPr>
+          <a:xfrm>
+            <a:off x="2985247" y="4744496"/>
+            <a:ext cx="6158460" cy="369332"/>
+          </a:xfrm>
+          <a:prstGeom prst="rect">
+            <a:avLst/>
+          </a:prstGeom>
+          <a:noFill/>
+        </p:spPr>
+        <p:txBody>
+          <a:bodyPr wrap="square">
+            <a:spAutoFit/>
+          </a:bodyPr>
+          <a:lstStyle/>
+          <a:p>
+            <a:pPr algn="ctr"/>
+            <a:r>
+              <a:rPr lang="es-MX" b="1" dirty="0">
+                <a:latin typeface="Imprint MT Shadow" panose="04020605060303030202" pitchFamily="82" charset="0"/>
+              </a:rPr>
+              <a:t>Publicado por: </a:t>
+            </a:r>
+            <a:r>
+              <a:rPr lang="en-US" b="1" dirty="0">
+                <a:latin typeface="Imprint MT Shadow" panose="04020605060303030202" pitchFamily="82" charset="0"/>
+              </a:rPr>
+              <a:t>Igor B. </a:t>
+            </a:r>
+            <a:r>
+              <a:rPr lang="en-US" b="1" dirty="0" err="1">
+                <a:latin typeface="Imprint MT Shadow" panose="04020605060303030202" pitchFamily="82" charset="0"/>
+              </a:rPr>
+              <a:t>Esipov</a:t>
+            </a:r>
+            <a:endParaRPr lang="es-CO" b="1" dirty="0">
+              <a:latin typeface="Imprint MT Shadow" panose="04020605060303030202" pitchFamily="82" charset="0"/>
+            </a:endParaRPr>
+          </a:p>
+        </p:txBody>
+      </p:sp>
+    </p:spTree>
+    <p:extLst>
+      <p:ext uri="{BB962C8B-B14F-4D97-AF65-F5344CB8AC3E}">
+        <p14:creationId xmlns:p14="http://schemas.microsoft.com/office/powerpoint/2010/main" val="3234633653"/>
+      </p:ext>
+    </p:extLst>
+  </p:cSld>
+  <p:clrMapOvr>
+    <a:masterClrMapping/>
+  </p:clrMapOvr>
+</p:sld>
+</file>
+
+<file path=ppt/slides/slide27.xml><?xml version="1.0" encoding="utf-8"?>
+<p:sld xmlns:a="http://schemas.openxmlformats.org/drawingml/2006/main" xmlns:r="http://schemas.openxmlformats.org/officeDocument/2006/relationships" xmlns:p="http://schemas.openxmlformats.org/presentationml/2006/main">
+  <p:cSld>
+    <p:spTree>
+      <p:nvGrpSpPr>
+        <p:cNvPr id="1" name=""/>
+        <p:cNvGrpSpPr/>
+        <p:nvPr/>
+      </p:nvGrpSpPr>
+      <p:grpSpPr>
+        <a:xfrm>
+          <a:off x="0" y="0"/>
+          <a:ext cx="0" cy="0"/>
+          <a:chOff x="0" y="0"/>
+          <a:chExt cx="0" cy="0"/>
+        </a:xfrm>
+      </p:grpSpPr>
+      <p:pic>
+        <p:nvPicPr>
+          <p:cNvPr id="1026" name="Picture 2" descr="Fondo rojo con textura vintage continental, rojo, retro, continental png |  PNGWing">
+            <a:extLst>
+              <a:ext uri="{FF2B5EF4-FFF2-40B4-BE49-F238E27FC236}">
+                <a16:creationId xmlns:a16="http://schemas.microsoft.com/office/drawing/2014/main" id="{65048E78-8E01-4EC2-8FA0-C0F9A4B8A93A}"/>
+              </a:ext>
+            </a:extLst>
+          </p:cNvPr>
+          <p:cNvPicPr>
+            <a:picLocks noChangeAspect="1" noChangeArrowheads="1"/>
+          </p:cNvPicPr>
+          <p:nvPr/>
+        </p:nvPicPr>
+        <p:blipFill>
+          <a:blip r:embed="rId2">
+            <a:extLst>
+              <a:ext uri="{28A0092B-C50C-407E-A947-70E740481C1C}">
+                <a14:useLocalDpi xmlns:a14="http://schemas.microsoft.com/office/drawing/2010/main" val="0"/>
+              </a:ext>
+            </a:extLst>
+          </a:blip>
+          <a:srcRect/>
+          <a:stretch>
+            <a:fillRect/>
+          </a:stretch>
+        </p:blipFill>
+        <p:spPr bwMode="auto">
+          <a:xfrm>
+            <a:off x="0" y="0"/>
+            <a:ext cx="12192000" cy="6696635"/>
+          </a:xfrm>
+          <a:prstGeom prst="rect">
+            <a:avLst/>
+          </a:prstGeom>
+          <a:noFill/>
+          <a:extLst>
+            <a:ext uri="{909E8E84-426E-40DD-AFC4-6F175D3DCCD1}">
+              <a14:hiddenFill xmlns:a14="http://schemas.microsoft.com/office/drawing/2010/main">
+                <a:solidFill>
+                  <a:srgbClr val="FFFFFF"/>
+                </a:solidFill>
+              </a14:hiddenFill>
+            </a:ext>
+          </a:extLst>
+        </p:spPr>
+      </p:pic>
+      <p:pic>
+        <p:nvPicPr>
+          <p:cNvPr id="3" name="Picture 4" descr="tablero de madera en estilo de dibujos animados 8853564 PNG">
+            <a:extLst>
+              <a:ext uri="{FF2B5EF4-FFF2-40B4-BE49-F238E27FC236}">
+                <a16:creationId xmlns:a16="http://schemas.microsoft.com/office/drawing/2014/main" id="{EFC82DF3-927C-4A51-8E8B-E1DA5E532552}"/>
+              </a:ext>
+            </a:extLst>
+          </p:cNvPr>
+          <p:cNvPicPr>
+            <a:picLocks noChangeAspect="1" noChangeArrowheads="1"/>
+          </p:cNvPicPr>
+          <p:nvPr/>
+        </p:nvPicPr>
+        <p:blipFill>
+          <a:blip r:embed="rId3">
+            <a:extLst>
+              <a:ext uri="{28A0092B-C50C-407E-A947-70E740481C1C}">
+                <a14:useLocalDpi xmlns:a14="http://schemas.microsoft.com/office/drawing/2010/main" val="0"/>
+              </a:ext>
+            </a:extLst>
+          </a:blip>
+          <a:srcRect/>
+          <a:stretch>
+            <a:fillRect/>
+          </a:stretch>
+        </p:blipFill>
+        <p:spPr bwMode="auto">
+          <a:xfrm>
+            <a:off x="2133887" y="1790401"/>
+            <a:ext cx="7924222" cy="3912585"/>
+          </a:xfrm>
+          <a:prstGeom prst="rect">
+            <a:avLst/>
+          </a:prstGeom>
+          <a:noFill/>
+          <a:extLst>
+            <a:ext uri="{909E8E84-426E-40DD-AFC4-6F175D3DCCD1}">
+              <a14:hiddenFill xmlns:a14="http://schemas.microsoft.com/office/drawing/2010/main">
+                <a:solidFill>
+                  <a:srgbClr val="FFFFFF"/>
+                </a:solidFill>
+              </a14:hiddenFill>
+            </a:ext>
+          </a:extLst>
+        </p:spPr>
+      </p:pic>
+      <p:sp>
+        <p:nvSpPr>
+          <p:cNvPr id="46" name="CuadroTexto 45">
+            <a:extLst>
+              <a:ext uri="{FF2B5EF4-FFF2-40B4-BE49-F238E27FC236}">
+                <a16:creationId xmlns:a16="http://schemas.microsoft.com/office/drawing/2014/main" id="{738A3F34-A4B1-4DDC-BBE8-4F245C52246D}"/>
+              </a:ext>
+            </a:extLst>
+          </p:cNvPr>
+          <p:cNvSpPr txBox="1"/>
+          <p:nvPr/>
+        </p:nvSpPr>
+        <p:spPr>
+          <a:xfrm>
+            <a:off x="3698235" y="1953417"/>
+            <a:ext cx="4786859" cy="369332"/>
+          </a:xfrm>
+          <a:prstGeom prst="rect">
+            <a:avLst/>
+          </a:prstGeom>
+          <a:noFill/>
+        </p:spPr>
+        <p:txBody>
+          <a:bodyPr wrap="square">
+            <a:spAutoFit/>
+          </a:bodyPr>
+          <a:lstStyle/>
+          <a:p>
+            <a:pPr algn="ctr"/>
+            <a:r>
+              <a:rPr lang="es-MX" b="1" i="0" dirty="0">
+                <a:effectLst/>
+                <a:latin typeface="Imprint MT Shadow" panose="04020605060303030202" pitchFamily="82" charset="0"/>
+              </a:rPr>
+              <a:t>Titulo: </a:t>
+            </a:r>
+            <a:r>
+              <a:rPr lang="en-US" b="1" i="0" dirty="0">
+                <a:effectLst/>
+                <a:latin typeface="Imprint MT Shadow" panose="04020605060303030202" pitchFamily="82" charset="0"/>
+              </a:rPr>
+              <a:t>Acta Alimentaria</a:t>
+            </a:r>
+            <a:endParaRPr lang="es-CO" b="1" dirty="0">
+              <a:latin typeface="Imprint MT Shadow" panose="04020605060303030202" pitchFamily="82" charset="0"/>
+            </a:endParaRPr>
+          </a:p>
+        </p:txBody>
+      </p:sp>
+      <p:sp>
+        <p:nvSpPr>
+          <p:cNvPr id="47" name="CuadroTexto 46">
+            <a:extLst>
+              <a:ext uri="{FF2B5EF4-FFF2-40B4-BE49-F238E27FC236}">
+                <a16:creationId xmlns:a16="http://schemas.microsoft.com/office/drawing/2014/main" id="{7F7AE6D4-BF2C-4D6B-A3A4-07B373895627}"/>
+              </a:ext>
+            </a:extLst>
+          </p:cNvPr>
+          <p:cNvSpPr txBox="1"/>
+          <p:nvPr/>
+        </p:nvSpPr>
+        <p:spPr>
+          <a:xfrm>
+            <a:off x="5513557" y="379491"/>
+            <a:ext cx="1438572" cy="1015663"/>
+          </a:xfrm>
+          <a:prstGeom prst="rect">
+            <a:avLst/>
+          </a:prstGeom>
+          <a:noFill/>
+        </p:spPr>
+        <p:txBody>
+          <a:bodyPr wrap="square" rtlCol="0">
+            <a:spAutoFit/>
+          </a:bodyPr>
+          <a:lstStyle/>
+          <a:p>
+            <a:pPr algn="ctr"/>
+            <a:r>
+              <a:rPr lang="es-CO" sz="6000" b="1" dirty="0">
+                <a:solidFill>
+                  <a:srgbClr val="FFFF00"/>
+                </a:solidFill>
+                <a:latin typeface="Cooper Black" panose="0208090404030B020404" pitchFamily="18" charset="0"/>
+              </a:rPr>
+              <a:t>Q4</a:t>
+            </a:r>
+          </a:p>
+        </p:txBody>
+      </p:sp>
+      <p:sp>
+        <p:nvSpPr>
+          <p:cNvPr id="48" name="CuadroTexto 47">
+            <a:extLst>
+              <a:ext uri="{FF2B5EF4-FFF2-40B4-BE49-F238E27FC236}">
+                <a16:creationId xmlns:a16="http://schemas.microsoft.com/office/drawing/2014/main" id="{81A58E24-5C80-48F2-81EE-B2460C9B0C03}"/>
+              </a:ext>
+            </a:extLst>
+          </p:cNvPr>
+          <p:cNvSpPr txBox="1"/>
+          <p:nvPr/>
+        </p:nvSpPr>
+        <p:spPr>
+          <a:xfrm>
+            <a:off x="5184002" y="2911906"/>
+            <a:ext cx="1815323" cy="369332"/>
+          </a:xfrm>
+          <a:prstGeom prst="rect">
+            <a:avLst/>
+          </a:prstGeom>
+          <a:noFill/>
+        </p:spPr>
+        <p:txBody>
+          <a:bodyPr wrap="square">
+            <a:spAutoFit/>
+          </a:bodyPr>
+          <a:lstStyle/>
+          <a:p>
+            <a:pPr algn="ctr"/>
+            <a:r>
+              <a:rPr lang="es-MX" b="1" i="0" dirty="0">
+                <a:effectLst/>
+                <a:latin typeface="Imprint MT Shadow" panose="04020605060303030202" pitchFamily="82" charset="0"/>
+              </a:rPr>
+              <a:t>Categoría: Q4</a:t>
+            </a:r>
+            <a:endParaRPr lang="es-CO" b="1" dirty="0">
+              <a:latin typeface="Imprint MT Shadow" panose="04020605060303030202" pitchFamily="82" charset="0"/>
+            </a:endParaRPr>
+          </a:p>
+        </p:txBody>
+      </p:sp>
+      <p:sp>
+        <p:nvSpPr>
+          <p:cNvPr id="7" name="CuadroTexto 6">
+            <a:extLst>
+              <a:ext uri="{FF2B5EF4-FFF2-40B4-BE49-F238E27FC236}">
+                <a16:creationId xmlns:a16="http://schemas.microsoft.com/office/drawing/2014/main" id="{A985E777-DDCE-4DD2-8278-DEBB2A071293}"/>
+              </a:ext>
+            </a:extLst>
+          </p:cNvPr>
+          <p:cNvSpPr txBox="1"/>
+          <p:nvPr/>
+        </p:nvSpPr>
+        <p:spPr>
+          <a:xfrm>
+            <a:off x="5184001" y="3828201"/>
+            <a:ext cx="2669081" cy="369332"/>
+          </a:xfrm>
+          <a:prstGeom prst="rect">
+            <a:avLst/>
+          </a:prstGeom>
+          <a:noFill/>
+        </p:spPr>
+        <p:txBody>
+          <a:bodyPr wrap="square">
+            <a:spAutoFit/>
+          </a:bodyPr>
+          <a:lstStyle/>
+          <a:p>
+            <a:pPr algn="ctr"/>
+            <a:r>
+              <a:rPr lang="es-MX" b="1" i="0" dirty="0">
+                <a:effectLst/>
+                <a:latin typeface="Imprint MT Shadow" panose="04020605060303030202" pitchFamily="82" charset="0"/>
+              </a:rPr>
+              <a:t>Contexto: Intern</a:t>
+            </a:r>
+            <a:r>
+              <a:rPr lang="es-MX" b="1" dirty="0">
+                <a:latin typeface="Imprint MT Shadow" panose="04020605060303030202" pitchFamily="82" charset="0"/>
+              </a:rPr>
+              <a:t>acional</a:t>
+            </a:r>
+            <a:endParaRPr lang="es-CO" b="1" dirty="0">
+              <a:latin typeface="Imprint MT Shadow" panose="04020605060303030202" pitchFamily="82" charset="0"/>
+            </a:endParaRPr>
+          </a:p>
+        </p:txBody>
+      </p:sp>
+      <p:sp>
+        <p:nvSpPr>
+          <p:cNvPr id="8" name="CuadroTexto 7">
+            <a:extLst>
+              <a:ext uri="{FF2B5EF4-FFF2-40B4-BE49-F238E27FC236}">
+                <a16:creationId xmlns:a16="http://schemas.microsoft.com/office/drawing/2014/main" id="{A1D628A2-2118-4DF9-A7AD-4C9F218C6D22}"/>
+              </a:ext>
+            </a:extLst>
+          </p:cNvPr>
+          <p:cNvSpPr txBox="1"/>
+          <p:nvPr/>
+        </p:nvSpPr>
+        <p:spPr>
+          <a:xfrm>
+            <a:off x="2985247" y="4744496"/>
+            <a:ext cx="6158460" cy="369332"/>
+          </a:xfrm>
+          <a:prstGeom prst="rect">
+            <a:avLst/>
+          </a:prstGeom>
+          <a:noFill/>
+        </p:spPr>
+        <p:txBody>
+          <a:bodyPr wrap="square">
+            <a:spAutoFit/>
+          </a:bodyPr>
+          <a:lstStyle/>
+          <a:p>
+            <a:pPr algn="ctr"/>
+            <a:r>
+              <a:rPr lang="es-MX" b="1" dirty="0">
+                <a:latin typeface="Imprint MT Shadow" panose="04020605060303030202" pitchFamily="82" charset="0"/>
+              </a:rPr>
+              <a:t>Publicado por: </a:t>
+            </a:r>
+            <a:r>
+              <a:rPr lang="en-US" b="1" dirty="0">
+                <a:latin typeface="Imprint MT Shadow" panose="04020605060303030202" pitchFamily="82" charset="0"/>
+              </a:rPr>
+              <a:t>A. </a:t>
+            </a:r>
+            <a:r>
+              <a:rPr lang="en-US" b="1" dirty="0" err="1">
+                <a:latin typeface="Imprint MT Shadow" panose="04020605060303030202" pitchFamily="82" charset="0"/>
+              </a:rPr>
+              <a:t>Salgo</a:t>
+            </a:r>
+            <a:endParaRPr lang="es-CO" b="1" dirty="0">
+              <a:latin typeface="Imprint MT Shadow" panose="04020605060303030202" pitchFamily="82" charset="0"/>
+            </a:endParaRPr>
+          </a:p>
+        </p:txBody>
+      </p:sp>
+    </p:spTree>
+    <p:extLst>
+      <p:ext uri="{BB962C8B-B14F-4D97-AF65-F5344CB8AC3E}">
+        <p14:creationId xmlns:p14="http://schemas.microsoft.com/office/powerpoint/2010/main" val="2373145124"/>
+      </p:ext>
+    </p:extLst>
+  </p:cSld>
+  <p:clrMapOvr>
+    <a:masterClrMapping/>
+  </p:clrMapOvr>
+</p:sld>
+</file>
+
+<file path=ppt/slides/slide28.xml><?xml version="1.0" encoding="utf-8"?>
+<p:sld xmlns:a="http://schemas.openxmlformats.org/drawingml/2006/main" xmlns:r="http://schemas.openxmlformats.org/officeDocument/2006/relationships" xmlns:p="http://schemas.openxmlformats.org/presentationml/2006/main">
+  <p:cSld>
+    <p:spTree>
+      <p:nvGrpSpPr>
+        <p:cNvPr id="1" name=""/>
+        <p:cNvGrpSpPr/>
+        <p:nvPr/>
+      </p:nvGrpSpPr>
+      <p:grpSpPr>
+        <a:xfrm>
+          <a:off x="0" y="0"/>
+          <a:ext cx="0" cy="0"/>
+          <a:chOff x="0" y="0"/>
+          <a:chExt cx="0" cy="0"/>
+        </a:xfrm>
+      </p:grpSpPr>
+      <p:pic>
+        <p:nvPicPr>
+          <p:cNvPr id="1026" name="Picture 2" descr="Fondo rojo con textura vintage continental, rojo, retro, continental png |  PNGWing">
+            <a:extLst>
+              <a:ext uri="{FF2B5EF4-FFF2-40B4-BE49-F238E27FC236}">
+                <a16:creationId xmlns:a16="http://schemas.microsoft.com/office/drawing/2014/main" id="{65048E78-8E01-4EC2-8FA0-C0F9A4B8A93A}"/>
+              </a:ext>
+            </a:extLst>
+          </p:cNvPr>
+          <p:cNvPicPr>
+            <a:picLocks noChangeAspect="1" noChangeArrowheads="1"/>
+          </p:cNvPicPr>
+          <p:nvPr/>
+        </p:nvPicPr>
+        <p:blipFill>
+          <a:blip r:embed="rId2">
+            <a:extLst>
+              <a:ext uri="{28A0092B-C50C-407E-A947-70E740481C1C}">
+                <a14:useLocalDpi xmlns:a14="http://schemas.microsoft.com/office/drawing/2010/main" val="0"/>
+              </a:ext>
+            </a:extLst>
+          </a:blip>
+          <a:srcRect/>
+          <a:stretch>
+            <a:fillRect/>
+          </a:stretch>
+        </p:blipFill>
+        <p:spPr bwMode="auto">
+          <a:xfrm>
+            <a:off x="0" y="0"/>
+            <a:ext cx="12192000" cy="6696635"/>
+          </a:xfrm>
+          <a:prstGeom prst="rect">
+            <a:avLst/>
+          </a:prstGeom>
+          <a:noFill/>
+          <a:extLst>
+            <a:ext uri="{909E8E84-426E-40DD-AFC4-6F175D3DCCD1}">
+              <a14:hiddenFill xmlns:a14="http://schemas.microsoft.com/office/drawing/2010/main">
+                <a:solidFill>
+                  <a:srgbClr val="FFFFFF"/>
+                </a:solidFill>
+              </a14:hiddenFill>
+            </a:ext>
+          </a:extLst>
+        </p:spPr>
+      </p:pic>
+      <p:pic>
+        <p:nvPicPr>
+          <p:cNvPr id="3" name="Picture 4" descr="tablero de madera en estilo de dibujos animados 8853564 PNG">
+            <a:extLst>
+              <a:ext uri="{FF2B5EF4-FFF2-40B4-BE49-F238E27FC236}">
+                <a16:creationId xmlns:a16="http://schemas.microsoft.com/office/drawing/2014/main" id="{EFC82DF3-927C-4A51-8E8B-E1DA5E532552}"/>
+              </a:ext>
+            </a:extLst>
+          </p:cNvPr>
+          <p:cNvPicPr>
+            <a:picLocks noChangeAspect="1" noChangeArrowheads="1"/>
+          </p:cNvPicPr>
+          <p:nvPr/>
+        </p:nvPicPr>
+        <p:blipFill>
+          <a:blip r:embed="rId3">
+            <a:extLst>
+              <a:ext uri="{28A0092B-C50C-407E-A947-70E740481C1C}">
+                <a14:useLocalDpi xmlns:a14="http://schemas.microsoft.com/office/drawing/2010/main" val="0"/>
+              </a:ext>
+            </a:extLst>
+          </a:blip>
+          <a:srcRect/>
+          <a:stretch>
+            <a:fillRect/>
+          </a:stretch>
+        </p:blipFill>
+        <p:spPr bwMode="auto">
+          <a:xfrm>
+            <a:off x="2133887" y="1790401"/>
+            <a:ext cx="7924222" cy="3912585"/>
+          </a:xfrm>
+          <a:prstGeom prst="rect">
+            <a:avLst/>
+          </a:prstGeom>
+          <a:noFill/>
+          <a:extLst>
+            <a:ext uri="{909E8E84-426E-40DD-AFC4-6F175D3DCCD1}">
+              <a14:hiddenFill xmlns:a14="http://schemas.microsoft.com/office/drawing/2010/main">
+                <a:solidFill>
+                  <a:srgbClr val="FFFFFF"/>
+                </a:solidFill>
+              </a14:hiddenFill>
+            </a:ext>
+          </a:extLst>
+        </p:spPr>
+      </p:pic>
+      <p:sp>
+        <p:nvSpPr>
+          <p:cNvPr id="46" name="CuadroTexto 45">
+            <a:extLst>
+              <a:ext uri="{FF2B5EF4-FFF2-40B4-BE49-F238E27FC236}">
+                <a16:creationId xmlns:a16="http://schemas.microsoft.com/office/drawing/2014/main" id="{738A3F34-A4B1-4DDC-BBE8-4F245C52246D}"/>
+              </a:ext>
+            </a:extLst>
+          </p:cNvPr>
+          <p:cNvSpPr txBox="1"/>
+          <p:nvPr/>
+        </p:nvSpPr>
+        <p:spPr>
+          <a:xfrm>
+            <a:off x="3698235" y="1953417"/>
+            <a:ext cx="4786859" cy="369332"/>
+          </a:xfrm>
+          <a:prstGeom prst="rect">
+            <a:avLst/>
+          </a:prstGeom>
+          <a:noFill/>
+        </p:spPr>
+        <p:txBody>
+          <a:bodyPr wrap="square">
+            <a:spAutoFit/>
+          </a:bodyPr>
+          <a:lstStyle/>
+          <a:p>
+            <a:pPr algn="ctr"/>
+            <a:r>
+              <a:rPr lang="es-MX" b="1" i="0" dirty="0">
+                <a:effectLst/>
+                <a:latin typeface="Imprint MT Shadow" panose="04020605060303030202" pitchFamily="82" charset="0"/>
+              </a:rPr>
+              <a:t>Titulo: </a:t>
+            </a:r>
+            <a:r>
+              <a:rPr lang="en-US" b="1" i="0" dirty="0">
+                <a:effectLst/>
+                <a:latin typeface="Imprint MT Shadow" panose="04020605060303030202" pitchFamily="82" charset="0"/>
+              </a:rPr>
+              <a:t>AATCC Review</a:t>
+            </a:r>
+            <a:endParaRPr lang="es-CO" b="1" dirty="0">
+              <a:latin typeface="Imprint MT Shadow" panose="04020605060303030202" pitchFamily="82" charset="0"/>
+            </a:endParaRPr>
+          </a:p>
+        </p:txBody>
+      </p:sp>
+      <p:sp>
+        <p:nvSpPr>
+          <p:cNvPr id="47" name="CuadroTexto 46">
+            <a:extLst>
+              <a:ext uri="{FF2B5EF4-FFF2-40B4-BE49-F238E27FC236}">
+                <a16:creationId xmlns:a16="http://schemas.microsoft.com/office/drawing/2014/main" id="{7F7AE6D4-BF2C-4D6B-A3A4-07B373895627}"/>
+              </a:ext>
+            </a:extLst>
+          </p:cNvPr>
+          <p:cNvSpPr txBox="1"/>
+          <p:nvPr/>
+        </p:nvSpPr>
+        <p:spPr>
+          <a:xfrm>
+            <a:off x="5513557" y="379491"/>
+            <a:ext cx="1438572" cy="1015663"/>
+          </a:xfrm>
+          <a:prstGeom prst="rect">
+            <a:avLst/>
+          </a:prstGeom>
+          <a:noFill/>
+        </p:spPr>
+        <p:txBody>
+          <a:bodyPr wrap="square" rtlCol="0">
+            <a:spAutoFit/>
+          </a:bodyPr>
+          <a:lstStyle/>
+          <a:p>
+            <a:pPr algn="ctr"/>
+            <a:r>
+              <a:rPr lang="es-CO" sz="6000" b="1" dirty="0">
+                <a:solidFill>
+                  <a:srgbClr val="FFFF00"/>
+                </a:solidFill>
+                <a:latin typeface="Cooper Black" panose="0208090404030B020404" pitchFamily="18" charset="0"/>
+              </a:rPr>
+              <a:t>Q4</a:t>
+            </a:r>
+          </a:p>
+        </p:txBody>
+      </p:sp>
+      <p:sp>
+        <p:nvSpPr>
+          <p:cNvPr id="48" name="CuadroTexto 47">
+            <a:extLst>
+              <a:ext uri="{FF2B5EF4-FFF2-40B4-BE49-F238E27FC236}">
+                <a16:creationId xmlns:a16="http://schemas.microsoft.com/office/drawing/2014/main" id="{81A58E24-5C80-48F2-81EE-B2460C9B0C03}"/>
+              </a:ext>
+            </a:extLst>
+          </p:cNvPr>
+          <p:cNvSpPr txBox="1"/>
+          <p:nvPr/>
+        </p:nvSpPr>
+        <p:spPr>
+          <a:xfrm>
+            <a:off x="5184002" y="2911906"/>
+            <a:ext cx="1815323" cy="369332"/>
+          </a:xfrm>
+          <a:prstGeom prst="rect">
+            <a:avLst/>
+          </a:prstGeom>
+          <a:noFill/>
+        </p:spPr>
+        <p:txBody>
+          <a:bodyPr wrap="square">
+            <a:spAutoFit/>
+          </a:bodyPr>
+          <a:lstStyle/>
+          <a:p>
+            <a:pPr algn="ctr"/>
+            <a:r>
+              <a:rPr lang="es-MX" b="1" i="0" dirty="0">
+                <a:effectLst/>
+                <a:latin typeface="Imprint MT Shadow" panose="04020605060303030202" pitchFamily="82" charset="0"/>
+              </a:rPr>
+              <a:t>Categoría: Q4</a:t>
+            </a:r>
+            <a:endParaRPr lang="es-CO" b="1" dirty="0">
+              <a:latin typeface="Imprint MT Shadow" panose="04020605060303030202" pitchFamily="82" charset="0"/>
+            </a:endParaRPr>
+          </a:p>
+        </p:txBody>
+      </p:sp>
+      <p:sp>
+        <p:nvSpPr>
+          <p:cNvPr id="7" name="CuadroTexto 6">
+            <a:extLst>
+              <a:ext uri="{FF2B5EF4-FFF2-40B4-BE49-F238E27FC236}">
+                <a16:creationId xmlns:a16="http://schemas.microsoft.com/office/drawing/2014/main" id="{A985E777-DDCE-4DD2-8278-DEBB2A071293}"/>
+              </a:ext>
+            </a:extLst>
+          </p:cNvPr>
+          <p:cNvSpPr txBox="1"/>
+          <p:nvPr/>
+        </p:nvSpPr>
+        <p:spPr>
+          <a:xfrm>
+            <a:off x="5184001" y="3828201"/>
+            <a:ext cx="2669081" cy="369332"/>
+          </a:xfrm>
+          <a:prstGeom prst="rect">
+            <a:avLst/>
+          </a:prstGeom>
+          <a:noFill/>
+        </p:spPr>
+        <p:txBody>
+          <a:bodyPr wrap="square">
+            <a:spAutoFit/>
+          </a:bodyPr>
+          <a:lstStyle/>
+          <a:p>
+            <a:pPr algn="ctr"/>
+            <a:r>
+              <a:rPr lang="es-MX" b="1" i="0" dirty="0">
+                <a:effectLst/>
+                <a:latin typeface="Imprint MT Shadow" panose="04020605060303030202" pitchFamily="82" charset="0"/>
+              </a:rPr>
+              <a:t>Contexto: Intern</a:t>
+            </a:r>
+            <a:r>
+              <a:rPr lang="es-MX" b="1" dirty="0">
+                <a:latin typeface="Imprint MT Shadow" panose="04020605060303030202" pitchFamily="82" charset="0"/>
+              </a:rPr>
+              <a:t>acional</a:t>
+            </a:r>
+            <a:endParaRPr lang="es-CO" b="1" dirty="0">
+              <a:latin typeface="Imprint MT Shadow" panose="04020605060303030202" pitchFamily="82" charset="0"/>
+            </a:endParaRPr>
+          </a:p>
+        </p:txBody>
+      </p:sp>
+      <p:sp>
+        <p:nvSpPr>
+          <p:cNvPr id="8" name="CuadroTexto 7">
+            <a:extLst>
+              <a:ext uri="{FF2B5EF4-FFF2-40B4-BE49-F238E27FC236}">
+                <a16:creationId xmlns:a16="http://schemas.microsoft.com/office/drawing/2014/main" id="{A1D628A2-2118-4DF9-A7AD-4C9F218C6D22}"/>
+              </a:ext>
+            </a:extLst>
+          </p:cNvPr>
+          <p:cNvSpPr txBox="1"/>
+          <p:nvPr/>
+        </p:nvSpPr>
+        <p:spPr>
+          <a:xfrm>
+            <a:off x="2985247" y="4744496"/>
+            <a:ext cx="6158460" cy="646331"/>
+          </a:xfrm>
+          <a:prstGeom prst="rect">
+            <a:avLst/>
+          </a:prstGeom>
+          <a:noFill/>
+        </p:spPr>
+        <p:txBody>
+          <a:bodyPr wrap="square">
+            <a:spAutoFit/>
+          </a:bodyPr>
+          <a:lstStyle/>
+          <a:p>
+            <a:pPr algn="ctr"/>
+            <a:r>
+              <a:rPr lang="es-MX" b="1" dirty="0">
+                <a:latin typeface="Imprint MT Shadow" panose="04020605060303030202" pitchFamily="82" charset="0"/>
+              </a:rPr>
+              <a:t>Publicado por: </a:t>
+            </a:r>
+            <a:r>
+              <a:rPr lang="en-US" b="1" dirty="0">
+                <a:latin typeface="Imprint MT Shadow" panose="04020605060303030202" pitchFamily="82" charset="0"/>
+              </a:rPr>
+              <a:t>Agriculture Association of Textile Chemical and Critical Reviews</a:t>
+            </a:r>
+            <a:endParaRPr lang="es-CO" b="1" dirty="0">
+              <a:latin typeface="Imprint MT Shadow" panose="04020605060303030202" pitchFamily="82" charset="0"/>
+            </a:endParaRPr>
+          </a:p>
+        </p:txBody>
+      </p:sp>
+    </p:spTree>
+    <p:extLst>
+      <p:ext uri="{BB962C8B-B14F-4D97-AF65-F5344CB8AC3E}">
+        <p14:creationId xmlns:p14="http://schemas.microsoft.com/office/powerpoint/2010/main" val="2657911253"/>
+      </p:ext>
+    </p:extLst>
+  </p:cSld>
+  <p:clrMapOvr>
+    <a:masterClrMapping/>
+  </p:clrMapOvr>
+</p:sld>
+</file>
+
+<file path=ppt/slides/slide29.xml><?xml version="1.0" encoding="utf-8"?>
+<p:sld xmlns:a="http://schemas.openxmlformats.org/drawingml/2006/main" xmlns:r="http://schemas.openxmlformats.org/officeDocument/2006/relationships" xmlns:p="http://schemas.openxmlformats.org/presentationml/2006/main">
+  <p:cSld>
+    <p:spTree>
+      <p:nvGrpSpPr>
+        <p:cNvPr id="1" name=""/>
+        <p:cNvGrpSpPr/>
+        <p:nvPr/>
+      </p:nvGrpSpPr>
+      <p:grpSpPr>
+        <a:xfrm>
+          <a:off x="0" y="0"/>
+          <a:ext cx="0" cy="0"/>
+          <a:chOff x="0" y="0"/>
+          <a:chExt cx="0" cy="0"/>
+        </a:xfrm>
+      </p:grpSpPr>
+      <p:pic>
+        <p:nvPicPr>
+          <p:cNvPr id="1026" name="Picture 2" descr="Fondo rojo con textura vintage continental, rojo, retro, continental png |  PNGWing">
+            <a:extLst>
+              <a:ext uri="{FF2B5EF4-FFF2-40B4-BE49-F238E27FC236}">
+                <a16:creationId xmlns:a16="http://schemas.microsoft.com/office/drawing/2014/main" id="{65048E78-8E01-4EC2-8FA0-C0F9A4B8A93A}"/>
+              </a:ext>
+            </a:extLst>
+          </p:cNvPr>
+          <p:cNvPicPr>
+            <a:picLocks noChangeAspect="1" noChangeArrowheads="1"/>
+          </p:cNvPicPr>
+          <p:nvPr/>
+        </p:nvPicPr>
+        <p:blipFill>
+          <a:blip r:embed="rId2">
+            <a:extLst>
+              <a:ext uri="{28A0092B-C50C-407E-A947-70E740481C1C}">
+                <a14:useLocalDpi xmlns:a14="http://schemas.microsoft.com/office/drawing/2010/main" val="0"/>
+              </a:ext>
+            </a:extLst>
+          </a:blip>
+          <a:srcRect/>
+          <a:stretch>
+            <a:fillRect/>
+          </a:stretch>
+        </p:blipFill>
+        <p:spPr bwMode="auto">
+          <a:xfrm>
+            <a:off x="0" y="0"/>
+            <a:ext cx="12192000" cy="6696635"/>
+          </a:xfrm>
+          <a:prstGeom prst="rect">
+            <a:avLst/>
+          </a:prstGeom>
+          <a:noFill/>
+          <a:extLst>
+            <a:ext uri="{909E8E84-426E-40DD-AFC4-6F175D3DCCD1}">
+              <a14:hiddenFill xmlns:a14="http://schemas.microsoft.com/office/drawing/2010/main">
+                <a:solidFill>
+                  <a:srgbClr val="FFFFFF"/>
+                </a:solidFill>
+              </a14:hiddenFill>
+            </a:ext>
+          </a:extLst>
+        </p:spPr>
+      </p:pic>
+      <p:pic>
+        <p:nvPicPr>
+          <p:cNvPr id="3" name="Picture 4" descr="tablero de madera en estilo de dibujos animados 8853564 PNG">
+            <a:extLst>
+              <a:ext uri="{FF2B5EF4-FFF2-40B4-BE49-F238E27FC236}">
+                <a16:creationId xmlns:a16="http://schemas.microsoft.com/office/drawing/2014/main" id="{EFC82DF3-927C-4A51-8E8B-E1DA5E532552}"/>
+              </a:ext>
+            </a:extLst>
+          </p:cNvPr>
+          <p:cNvPicPr>
+            <a:picLocks noChangeAspect="1" noChangeArrowheads="1"/>
+          </p:cNvPicPr>
+          <p:nvPr/>
+        </p:nvPicPr>
+        <p:blipFill>
+          <a:blip r:embed="rId3">
+            <a:extLst>
+              <a:ext uri="{28A0092B-C50C-407E-A947-70E740481C1C}">
+                <a14:useLocalDpi xmlns:a14="http://schemas.microsoft.com/office/drawing/2010/main" val="0"/>
+              </a:ext>
+            </a:extLst>
+          </a:blip>
+          <a:srcRect/>
+          <a:stretch>
+            <a:fillRect/>
+          </a:stretch>
+        </p:blipFill>
+        <p:spPr bwMode="auto">
+          <a:xfrm>
+            <a:off x="2133887" y="1790401"/>
+            <a:ext cx="7924222" cy="3912585"/>
+          </a:xfrm>
+          <a:prstGeom prst="rect">
+            <a:avLst/>
+          </a:prstGeom>
+          <a:noFill/>
+          <a:extLst>
+            <a:ext uri="{909E8E84-426E-40DD-AFC4-6F175D3DCCD1}">
+              <a14:hiddenFill xmlns:a14="http://schemas.microsoft.com/office/drawing/2010/main">
+                <a:solidFill>
+                  <a:srgbClr val="FFFFFF"/>
+                </a:solidFill>
+              </a14:hiddenFill>
+            </a:ext>
+          </a:extLst>
+        </p:spPr>
+      </p:pic>
+      <p:sp>
+        <p:nvSpPr>
+          <p:cNvPr id="46" name="CuadroTexto 45">
+            <a:extLst>
+              <a:ext uri="{FF2B5EF4-FFF2-40B4-BE49-F238E27FC236}">
+                <a16:creationId xmlns:a16="http://schemas.microsoft.com/office/drawing/2014/main" id="{738A3F34-A4B1-4DDC-BBE8-4F245C52246D}"/>
+              </a:ext>
+            </a:extLst>
+          </p:cNvPr>
+          <p:cNvSpPr txBox="1"/>
+          <p:nvPr/>
+        </p:nvSpPr>
+        <p:spPr>
+          <a:xfrm>
+            <a:off x="3698235" y="1953417"/>
+            <a:ext cx="4786859" cy="369332"/>
+          </a:xfrm>
+          <a:prstGeom prst="rect">
+            <a:avLst/>
+          </a:prstGeom>
+          <a:noFill/>
+        </p:spPr>
+        <p:txBody>
+          <a:bodyPr wrap="square">
+            <a:spAutoFit/>
+          </a:bodyPr>
+          <a:lstStyle/>
+          <a:p>
+            <a:pPr algn="ctr"/>
+            <a:r>
+              <a:rPr lang="es-MX" b="1" i="0" dirty="0">
+                <a:effectLst/>
+                <a:latin typeface="Imprint MT Shadow" panose="04020605060303030202" pitchFamily="82" charset="0"/>
+              </a:rPr>
+              <a:t>Titulo: </a:t>
+            </a:r>
+            <a:r>
+              <a:rPr lang="en-US" b="1" i="0" dirty="0">
+                <a:effectLst/>
+                <a:latin typeface="Imprint MT Shadow" panose="04020605060303030202" pitchFamily="82" charset="0"/>
+              </a:rPr>
+              <a:t>Acta </a:t>
+            </a:r>
+            <a:r>
+              <a:rPr lang="en-US" b="1" i="0" dirty="0" err="1">
+                <a:effectLst/>
+                <a:latin typeface="Imprint MT Shadow" panose="04020605060303030202" pitchFamily="82" charset="0"/>
+              </a:rPr>
+              <a:t>Bioethica</a:t>
+            </a:r>
+            <a:endParaRPr lang="es-CO" b="1" dirty="0">
+              <a:latin typeface="Imprint MT Shadow" panose="04020605060303030202" pitchFamily="82" charset="0"/>
+            </a:endParaRPr>
+          </a:p>
+        </p:txBody>
+      </p:sp>
+      <p:sp>
+        <p:nvSpPr>
+          <p:cNvPr id="47" name="CuadroTexto 46">
+            <a:extLst>
+              <a:ext uri="{FF2B5EF4-FFF2-40B4-BE49-F238E27FC236}">
+                <a16:creationId xmlns:a16="http://schemas.microsoft.com/office/drawing/2014/main" id="{7F7AE6D4-BF2C-4D6B-A3A4-07B373895627}"/>
+              </a:ext>
+            </a:extLst>
+          </p:cNvPr>
+          <p:cNvSpPr txBox="1"/>
+          <p:nvPr/>
+        </p:nvSpPr>
+        <p:spPr>
+          <a:xfrm>
+            <a:off x="5513557" y="379491"/>
+            <a:ext cx="1438572" cy="1015663"/>
+          </a:xfrm>
+          <a:prstGeom prst="rect">
+            <a:avLst/>
+          </a:prstGeom>
+          <a:noFill/>
+        </p:spPr>
+        <p:txBody>
+          <a:bodyPr wrap="square" rtlCol="0">
+            <a:spAutoFit/>
+          </a:bodyPr>
+          <a:lstStyle/>
+          <a:p>
+            <a:pPr algn="ctr"/>
+            <a:r>
+              <a:rPr lang="es-CO" sz="6000" b="1" dirty="0">
+                <a:solidFill>
+                  <a:srgbClr val="FFFF00"/>
+                </a:solidFill>
+                <a:latin typeface="Cooper Black" panose="0208090404030B020404" pitchFamily="18" charset="0"/>
+              </a:rPr>
+              <a:t>Q4</a:t>
+            </a:r>
+          </a:p>
+        </p:txBody>
+      </p:sp>
+      <p:sp>
+        <p:nvSpPr>
+          <p:cNvPr id="48" name="CuadroTexto 47">
+            <a:extLst>
+              <a:ext uri="{FF2B5EF4-FFF2-40B4-BE49-F238E27FC236}">
+                <a16:creationId xmlns:a16="http://schemas.microsoft.com/office/drawing/2014/main" id="{81A58E24-5C80-48F2-81EE-B2460C9B0C03}"/>
+              </a:ext>
+            </a:extLst>
+          </p:cNvPr>
+          <p:cNvSpPr txBox="1"/>
+          <p:nvPr/>
+        </p:nvSpPr>
+        <p:spPr>
+          <a:xfrm>
+            <a:off x="5184002" y="2911906"/>
+            <a:ext cx="1815323" cy="369332"/>
+          </a:xfrm>
+          <a:prstGeom prst="rect">
+            <a:avLst/>
+          </a:prstGeom>
+          <a:noFill/>
+        </p:spPr>
+        <p:txBody>
+          <a:bodyPr wrap="square">
+            <a:spAutoFit/>
+          </a:bodyPr>
+          <a:lstStyle/>
+          <a:p>
+            <a:pPr algn="ctr"/>
+            <a:r>
+              <a:rPr lang="es-MX" b="1" i="0" dirty="0">
+                <a:effectLst/>
+                <a:latin typeface="Imprint MT Shadow" panose="04020605060303030202" pitchFamily="82" charset="0"/>
+              </a:rPr>
+              <a:t>Categoría: Q4</a:t>
+            </a:r>
+            <a:endParaRPr lang="es-CO" b="1" dirty="0">
+              <a:latin typeface="Imprint MT Shadow" panose="04020605060303030202" pitchFamily="82" charset="0"/>
+            </a:endParaRPr>
+          </a:p>
+        </p:txBody>
+      </p:sp>
+      <p:sp>
+        <p:nvSpPr>
+          <p:cNvPr id="7" name="CuadroTexto 6">
+            <a:extLst>
+              <a:ext uri="{FF2B5EF4-FFF2-40B4-BE49-F238E27FC236}">
+                <a16:creationId xmlns:a16="http://schemas.microsoft.com/office/drawing/2014/main" id="{A985E777-DDCE-4DD2-8278-DEBB2A071293}"/>
+              </a:ext>
+            </a:extLst>
+          </p:cNvPr>
+          <p:cNvSpPr txBox="1"/>
+          <p:nvPr/>
+        </p:nvSpPr>
+        <p:spPr>
+          <a:xfrm>
+            <a:off x="5184001" y="3828201"/>
+            <a:ext cx="2669081" cy="369332"/>
+          </a:xfrm>
+          <a:prstGeom prst="rect">
+            <a:avLst/>
+          </a:prstGeom>
+          <a:noFill/>
+        </p:spPr>
+        <p:txBody>
+          <a:bodyPr wrap="square">
+            <a:spAutoFit/>
+          </a:bodyPr>
+          <a:lstStyle/>
+          <a:p>
+            <a:pPr algn="ctr"/>
+            <a:r>
+              <a:rPr lang="es-MX" b="1" i="0" dirty="0">
+                <a:effectLst/>
+                <a:latin typeface="Imprint MT Shadow" panose="04020605060303030202" pitchFamily="82" charset="0"/>
+              </a:rPr>
+              <a:t>Contexto: Intern</a:t>
+            </a:r>
+            <a:r>
+              <a:rPr lang="es-MX" b="1" dirty="0">
+                <a:latin typeface="Imprint MT Shadow" panose="04020605060303030202" pitchFamily="82" charset="0"/>
+              </a:rPr>
+              <a:t>acional</a:t>
+            </a:r>
+            <a:endParaRPr lang="es-CO" b="1" dirty="0">
+              <a:latin typeface="Imprint MT Shadow" panose="04020605060303030202" pitchFamily="82" charset="0"/>
+            </a:endParaRPr>
+          </a:p>
+        </p:txBody>
+      </p:sp>
+      <p:sp>
+        <p:nvSpPr>
+          <p:cNvPr id="8" name="CuadroTexto 7">
+            <a:extLst>
+              <a:ext uri="{FF2B5EF4-FFF2-40B4-BE49-F238E27FC236}">
+                <a16:creationId xmlns:a16="http://schemas.microsoft.com/office/drawing/2014/main" id="{A1D628A2-2118-4DF9-A7AD-4C9F218C6D22}"/>
+              </a:ext>
+            </a:extLst>
+          </p:cNvPr>
+          <p:cNvSpPr txBox="1"/>
+          <p:nvPr/>
+        </p:nvSpPr>
+        <p:spPr>
+          <a:xfrm>
+            <a:off x="3321423" y="4744496"/>
+            <a:ext cx="6266329" cy="923330"/>
+          </a:xfrm>
+          <a:prstGeom prst="rect">
+            <a:avLst/>
+          </a:prstGeom>
+          <a:noFill/>
+        </p:spPr>
+        <p:txBody>
+          <a:bodyPr wrap="square">
+            <a:spAutoFit/>
+          </a:bodyPr>
+          <a:lstStyle/>
+          <a:p>
+            <a:pPr algn="ctr"/>
+            <a:r>
+              <a:rPr lang="es-MX" b="1" dirty="0">
+                <a:latin typeface="Imprint MT Shadow" panose="04020605060303030202" pitchFamily="82" charset="0"/>
+              </a:rPr>
+              <a:t>Publicado por: Dr. Fernando Lolas </a:t>
+            </a:r>
+            <a:r>
+              <a:rPr lang="es-MX" b="1" dirty="0" err="1">
+                <a:latin typeface="Imprint MT Shadow" panose="04020605060303030202" pitchFamily="82" charset="0"/>
+              </a:rPr>
+              <a:t>Stepke</a:t>
+            </a:r>
+            <a:r>
+              <a:rPr lang="es-MX" b="1" dirty="0">
+                <a:latin typeface="Imprint MT Shadow" panose="04020605060303030202" pitchFamily="82" charset="0"/>
+              </a:rPr>
+              <a:t> , Centro Interdisciplinario de Estudios en Bioética, Universidad de Chile , Chile</a:t>
+            </a:r>
+            <a:endParaRPr lang="es-CO" b="1" dirty="0">
+              <a:latin typeface="Imprint MT Shadow" panose="04020605060303030202" pitchFamily="82" charset="0"/>
+            </a:endParaRPr>
+          </a:p>
+        </p:txBody>
+      </p:sp>
+    </p:spTree>
+    <p:extLst>
+      <p:ext uri="{BB962C8B-B14F-4D97-AF65-F5344CB8AC3E}">
+        <p14:creationId xmlns:p14="http://schemas.microsoft.com/office/powerpoint/2010/main" val="4067397372"/>
       </p:ext>
     </p:extLst>
   </p:cSld>

</xml_diff>